<commit_message>
add folders for figures chapter 10
</commit_message>
<xml_diff>
--- a/Figures/Chapter_10/drawings/Fig10 drawings.pptx
+++ b/Figures/Chapter_10/drawings/Fig10 drawings.pptx
@@ -202,7 +202,7 @@
           <a:p>
             <a:fld id="{326D34BC-276F-46AD-B176-336C3E79BC3C}" type="datetimeFigureOut">
               <a:rPr lang="en-GB" smtClean="0"/>
-              <a:t>20/07/2023</a:t>
+              <a:t>22/07/2023</a:t>
             </a:fld>
             <a:endParaRPr lang="en-GB"/>
           </a:p>
@@ -787,7 +787,7 @@
           <a:p>
             <a:fld id="{8B1A925D-6802-4F82-B3A4-43BDB522D203}" type="datetimeFigureOut">
               <a:rPr lang="en-GB" smtClean="0"/>
-              <a:t>20/07/2023</a:t>
+              <a:t>22/07/2023</a:t>
             </a:fld>
             <a:endParaRPr lang="en-GB"/>
           </a:p>
@@ -987,7 +987,7 @@
           <a:p>
             <a:fld id="{8B1A925D-6802-4F82-B3A4-43BDB522D203}" type="datetimeFigureOut">
               <a:rPr lang="en-GB" smtClean="0"/>
-              <a:t>20/07/2023</a:t>
+              <a:t>22/07/2023</a:t>
             </a:fld>
             <a:endParaRPr lang="en-GB"/>
           </a:p>
@@ -1197,7 +1197,7 @@
           <a:p>
             <a:fld id="{8B1A925D-6802-4F82-B3A4-43BDB522D203}" type="datetimeFigureOut">
               <a:rPr lang="en-GB" smtClean="0"/>
-              <a:t>20/07/2023</a:t>
+              <a:t>22/07/2023</a:t>
             </a:fld>
             <a:endParaRPr lang="en-GB"/>
           </a:p>
@@ -1397,7 +1397,7 @@
           <a:p>
             <a:fld id="{8B1A925D-6802-4F82-B3A4-43BDB522D203}" type="datetimeFigureOut">
               <a:rPr lang="en-GB" smtClean="0"/>
-              <a:t>20/07/2023</a:t>
+              <a:t>22/07/2023</a:t>
             </a:fld>
             <a:endParaRPr lang="en-GB"/>
           </a:p>
@@ -1673,7 +1673,7 @@
           <a:p>
             <a:fld id="{8B1A925D-6802-4F82-B3A4-43BDB522D203}" type="datetimeFigureOut">
               <a:rPr lang="en-GB" smtClean="0"/>
-              <a:t>20/07/2023</a:t>
+              <a:t>22/07/2023</a:t>
             </a:fld>
             <a:endParaRPr lang="en-GB"/>
           </a:p>
@@ -1941,7 +1941,7 @@
           <a:p>
             <a:fld id="{8B1A925D-6802-4F82-B3A4-43BDB522D203}" type="datetimeFigureOut">
               <a:rPr lang="en-GB" smtClean="0"/>
-              <a:t>20/07/2023</a:t>
+              <a:t>22/07/2023</a:t>
             </a:fld>
             <a:endParaRPr lang="en-GB"/>
           </a:p>
@@ -2356,7 +2356,7 @@
           <a:p>
             <a:fld id="{8B1A925D-6802-4F82-B3A4-43BDB522D203}" type="datetimeFigureOut">
               <a:rPr lang="en-GB" smtClean="0"/>
-              <a:t>20/07/2023</a:t>
+              <a:t>22/07/2023</a:t>
             </a:fld>
             <a:endParaRPr lang="en-GB"/>
           </a:p>
@@ -2498,7 +2498,7 @@
           <a:p>
             <a:fld id="{8B1A925D-6802-4F82-B3A4-43BDB522D203}" type="datetimeFigureOut">
               <a:rPr lang="en-GB" smtClean="0"/>
-              <a:t>20/07/2023</a:t>
+              <a:t>22/07/2023</a:t>
             </a:fld>
             <a:endParaRPr lang="en-GB"/>
           </a:p>
@@ -2611,7 +2611,7 @@
           <a:p>
             <a:fld id="{8B1A925D-6802-4F82-B3A4-43BDB522D203}" type="datetimeFigureOut">
               <a:rPr lang="en-GB" smtClean="0"/>
-              <a:t>20/07/2023</a:t>
+              <a:t>22/07/2023</a:t>
             </a:fld>
             <a:endParaRPr lang="en-GB"/>
           </a:p>
@@ -2924,7 +2924,7 @@
           <a:p>
             <a:fld id="{8B1A925D-6802-4F82-B3A4-43BDB522D203}" type="datetimeFigureOut">
               <a:rPr lang="en-GB" smtClean="0"/>
-              <a:t>20/07/2023</a:t>
+              <a:t>22/07/2023</a:t>
             </a:fld>
             <a:endParaRPr lang="en-GB"/>
           </a:p>
@@ -3213,7 +3213,7 @@
           <a:p>
             <a:fld id="{8B1A925D-6802-4F82-B3A4-43BDB522D203}" type="datetimeFigureOut">
               <a:rPr lang="en-GB" smtClean="0"/>
-              <a:t>20/07/2023</a:t>
+              <a:t>22/07/2023</a:t>
             </a:fld>
             <a:endParaRPr lang="en-GB"/>
           </a:p>
@@ -3456,7 +3456,7 @@
           <a:p>
             <a:fld id="{8B1A925D-6802-4F82-B3A4-43BDB522D203}" type="datetimeFigureOut">
               <a:rPr lang="en-GB" smtClean="0"/>
-              <a:t>20/07/2023</a:t>
+              <a:t>22/07/2023</a:t>
             </a:fld>
             <a:endParaRPr lang="en-GB"/>
           </a:p>
@@ -6357,47 +6357,6 @@
           </a:fontRef>
         </p:style>
       </p:cxnSp>
-      <p:pic>
-        <p:nvPicPr>
-          <p:cNvPr id="3" name="Imagen 4" descr="Gráfico, Gráfico de líneas&#10;&#10;Descripción generada automáticamente">
-            <a:extLst>
-              <a:ext uri="{FF2B5EF4-FFF2-40B4-BE49-F238E27FC236}">
-                <a16:creationId xmlns:a16="http://schemas.microsoft.com/office/drawing/2014/main" id="{7E638DC0-C7D2-991F-7667-29100BDF4168}"/>
-              </a:ext>
-            </a:extLst>
-          </p:cNvPr>
-          <p:cNvPicPr>
-            <a:picLocks noChangeAspect="1"/>
-          </p:cNvPicPr>
-          <p:nvPr/>
-        </p:nvPicPr>
-        <p:blipFill>
-          <a:blip r:embed="rId2" cstate="print">
-            <a:extLst>
-              <a:ext uri="{28A0092B-C50C-407E-A947-70E740481C1C}">
-                <a14:useLocalDpi xmlns:a14="http://schemas.microsoft.com/office/drawing/2010/main" val="0"/>
-              </a:ext>
-            </a:extLst>
-          </a:blip>
-          <a:srcRect/>
-          <a:stretch>
-            <a:fillRect/>
-          </a:stretch>
-        </p:blipFill>
-        <p:spPr bwMode="auto">
-          <a:xfrm>
-            <a:off x="7463190" y="329847"/>
-            <a:ext cx="2612699" cy="1417704"/>
-          </a:xfrm>
-          <a:prstGeom prst="rect">
-            <a:avLst/>
-          </a:prstGeom>
-          <a:noFill/>
-          <a:ln>
-            <a:noFill/>
-          </a:ln>
-        </p:spPr>
-      </p:pic>
       <p:grpSp>
         <p:nvGrpSpPr>
           <p:cNvPr id="53" name="Group 52">
@@ -8653,88 +8612,6 @@
           </a:fontRef>
         </p:style>
       </p:cxnSp>
-      <p:pic>
-        <p:nvPicPr>
-          <p:cNvPr id="4" name="Imagen 1" descr="Imagen que contiene Gráfico&#10;&#10;Descripción generada automáticamente">
-            <a:extLst>
-              <a:ext uri="{FF2B5EF4-FFF2-40B4-BE49-F238E27FC236}">
-                <a16:creationId xmlns:a16="http://schemas.microsoft.com/office/drawing/2014/main" id="{64FAC296-7874-B8A8-DAEB-A097DAAD8456}"/>
-              </a:ext>
-            </a:extLst>
-          </p:cNvPr>
-          <p:cNvPicPr>
-            <a:picLocks noChangeAspect="1"/>
-          </p:cNvPicPr>
-          <p:nvPr/>
-        </p:nvPicPr>
-        <p:blipFill>
-          <a:blip r:embed="rId11" cstate="print">
-            <a:extLst>
-              <a:ext uri="{28A0092B-C50C-407E-A947-70E740481C1C}">
-                <a14:useLocalDpi xmlns:a14="http://schemas.microsoft.com/office/drawing/2010/main" val="0"/>
-              </a:ext>
-            </a:extLst>
-          </a:blip>
-          <a:srcRect/>
-          <a:stretch>
-            <a:fillRect/>
-          </a:stretch>
-        </p:blipFill>
-        <p:spPr bwMode="auto">
-          <a:xfrm>
-            <a:off x="6912365" y="2290735"/>
-            <a:ext cx="3993515" cy="1406525"/>
-          </a:xfrm>
-          <a:prstGeom prst="rect">
-            <a:avLst/>
-          </a:prstGeom>
-          <a:noFill/>
-          <a:ln>
-            <a:noFill/>
-          </a:ln>
-        </p:spPr>
-      </p:pic>
-      <p:pic>
-        <p:nvPicPr>
-          <p:cNvPr id="6" name="Imagen 1" descr="Imagen que contiene panel solar, tabla&#10;&#10;Descripción generada automáticamente">
-            <a:extLst>
-              <a:ext uri="{FF2B5EF4-FFF2-40B4-BE49-F238E27FC236}">
-                <a16:creationId xmlns:a16="http://schemas.microsoft.com/office/drawing/2014/main" id="{C865D191-2BC4-9CEC-1924-CD653FA3F48C}"/>
-              </a:ext>
-            </a:extLst>
-          </p:cNvPr>
-          <p:cNvPicPr>
-            <a:picLocks noChangeAspect="1"/>
-          </p:cNvPicPr>
-          <p:nvPr/>
-        </p:nvPicPr>
-        <p:blipFill>
-          <a:blip r:embed="rId12" cstate="print">
-            <a:extLst>
-              <a:ext uri="{28A0092B-C50C-407E-A947-70E740481C1C}">
-                <a14:useLocalDpi xmlns:a14="http://schemas.microsoft.com/office/drawing/2010/main" val="0"/>
-              </a:ext>
-            </a:extLst>
-          </a:blip>
-          <a:srcRect/>
-          <a:stretch>
-            <a:fillRect/>
-          </a:stretch>
-        </p:blipFill>
-        <p:spPr bwMode="auto">
-          <a:xfrm>
-            <a:off x="6289864" y="4435830"/>
-            <a:ext cx="4959350" cy="1873250"/>
-          </a:xfrm>
-          <a:prstGeom prst="rect">
-            <a:avLst/>
-          </a:prstGeom>
-          <a:noFill/>
-          <a:ln>
-            <a:noFill/>
-          </a:ln>
-        </p:spPr>
-      </p:pic>
     </p:spTree>
     <p:extLst>
       <p:ext uri="{BB962C8B-B14F-4D97-AF65-F5344CB8AC3E}">

</xml_diff>

<commit_message>
Add figure Problem 10.11
</commit_message>
<xml_diff>
--- a/Figures/Chapter_10/drawings/Fig10 drawings.pptx
+++ b/Figures/Chapter_10/drawings/Fig10 drawings.pptx
@@ -5,15 +5,16 @@
     <p:sldMasterId id="2147483648" r:id="rId1"/>
   </p:sldMasterIdLst>
   <p:notesMasterIdLst>
-    <p:notesMasterId r:id="rId8"/>
+    <p:notesMasterId r:id="rId9"/>
   </p:notesMasterIdLst>
   <p:sldIdLst>
     <p:sldId id="262" r:id="rId2"/>
     <p:sldId id="261" r:id="rId3"/>
     <p:sldId id="260" r:id="rId4"/>
-    <p:sldId id="264" r:id="rId5"/>
-    <p:sldId id="265" r:id="rId6"/>
-    <p:sldId id="267" r:id="rId7"/>
+    <p:sldId id="268" r:id="rId5"/>
+    <p:sldId id="264" r:id="rId6"/>
+    <p:sldId id="265" r:id="rId7"/>
+    <p:sldId id="267" r:id="rId8"/>
   </p:sldIdLst>
   <p:sldSz cx="12192000" cy="6858000"/>
   <p:notesSz cx="6858000" cy="9144000"/>
@@ -202,7 +203,7 @@
           <a:p>
             <a:fld id="{326D34BC-276F-46AD-B176-336C3E79BC3C}" type="datetimeFigureOut">
               <a:rPr lang="en-GB" smtClean="0"/>
-              <a:t>22/07/2023</a:t>
+              <a:t>26/07/2023</a:t>
             </a:fld>
             <a:endParaRPr lang="en-GB"/>
           </a:p>
@@ -535,7 +536,7 @@
           <a:p>
             <a:fld id="{261FD654-EF6A-4074-B1E5-17371956E99F}" type="slidenum">
               <a:rPr lang="en-GB" smtClean="0"/>
-              <a:t>5</a:t>
+              <a:t>6</a:t>
             </a:fld>
             <a:endParaRPr lang="en-GB"/>
           </a:p>
@@ -619,7 +620,7 @@
           <a:p>
             <a:fld id="{261FD654-EF6A-4074-B1E5-17371956E99F}" type="slidenum">
               <a:rPr lang="en-GB" smtClean="0"/>
-              <a:t>6</a:t>
+              <a:t>7</a:t>
             </a:fld>
             <a:endParaRPr lang="en-GB"/>
           </a:p>
@@ -787,7 +788,7 @@
           <a:p>
             <a:fld id="{8B1A925D-6802-4F82-B3A4-43BDB522D203}" type="datetimeFigureOut">
               <a:rPr lang="en-GB" smtClean="0"/>
-              <a:t>22/07/2023</a:t>
+              <a:t>26/07/2023</a:t>
             </a:fld>
             <a:endParaRPr lang="en-GB"/>
           </a:p>
@@ -987,7 +988,7 @@
           <a:p>
             <a:fld id="{8B1A925D-6802-4F82-B3A4-43BDB522D203}" type="datetimeFigureOut">
               <a:rPr lang="en-GB" smtClean="0"/>
-              <a:t>22/07/2023</a:t>
+              <a:t>26/07/2023</a:t>
             </a:fld>
             <a:endParaRPr lang="en-GB"/>
           </a:p>
@@ -1197,7 +1198,7 @@
           <a:p>
             <a:fld id="{8B1A925D-6802-4F82-B3A4-43BDB522D203}" type="datetimeFigureOut">
               <a:rPr lang="en-GB" smtClean="0"/>
-              <a:t>22/07/2023</a:t>
+              <a:t>26/07/2023</a:t>
             </a:fld>
             <a:endParaRPr lang="en-GB"/>
           </a:p>
@@ -1397,7 +1398,7 @@
           <a:p>
             <a:fld id="{8B1A925D-6802-4F82-B3A4-43BDB522D203}" type="datetimeFigureOut">
               <a:rPr lang="en-GB" smtClean="0"/>
-              <a:t>22/07/2023</a:t>
+              <a:t>26/07/2023</a:t>
             </a:fld>
             <a:endParaRPr lang="en-GB"/>
           </a:p>
@@ -1673,7 +1674,7 @@
           <a:p>
             <a:fld id="{8B1A925D-6802-4F82-B3A4-43BDB522D203}" type="datetimeFigureOut">
               <a:rPr lang="en-GB" smtClean="0"/>
-              <a:t>22/07/2023</a:t>
+              <a:t>26/07/2023</a:t>
             </a:fld>
             <a:endParaRPr lang="en-GB"/>
           </a:p>
@@ -1941,7 +1942,7 @@
           <a:p>
             <a:fld id="{8B1A925D-6802-4F82-B3A4-43BDB522D203}" type="datetimeFigureOut">
               <a:rPr lang="en-GB" smtClean="0"/>
-              <a:t>22/07/2023</a:t>
+              <a:t>26/07/2023</a:t>
             </a:fld>
             <a:endParaRPr lang="en-GB"/>
           </a:p>
@@ -2356,7 +2357,7 @@
           <a:p>
             <a:fld id="{8B1A925D-6802-4F82-B3A4-43BDB522D203}" type="datetimeFigureOut">
               <a:rPr lang="en-GB" smtClean="0"/>
-              <a:t>22/07/2023</a:t>
+              <a:t>26/07/2023</a:t>
             </a:fld>
             <a:endParaRPr lang="en-GB"/>
           </a:p>
@@ -2498,7 +2499,7 @@
           <a:p>
             <a:fld id="{8B1A925D-6802-4F82-B3A4-43BDB522D203}" type="datetimeFigureOut">
               <a:rPr lang="en-GB" smtClean="0"/>
-              <a:t>22/07/2023</a:t>
+              <a:t>26/07/2023</a:t>
             </a:fld>
             <a:endParaRPr lang="en-GB"/>
           </a:p>
@@ -2611,7 +2612,7 @@
           <a:p>
             <a:fld id="{8B1A925D-6802-4F82-B3A4-43BDB522D203}" type="datetimeFigureOut">
               <a:rPr lang="en-GB" smtClean="0"/>
-              <a:t>22/07/2023</a:t>
+              <a:t>26/07/2023</a:t>
             </a:fld>
             <a:endParaRPr lang="en-GB"/>
           </a:p>
@@ -2924,7 +2925,7 @@
           <a:p>
             <a:fld id="{8B1A925D-6802-4F82-B3A4-43BDB522D203}" type="datetimeFigureOut">
               <a:rPr lang="en-GB" smtClean="0"/>
-              <a:t>22/07/2023</a:t>
+              <a:t>26/07/2023</a:t>
             </a:fld>
             <a:endParaRPr lang="en-GB"/>
           </a:p>
@@ -3213,7 +3214,7 @@
           <a:p>
             <a:fld id="{8B1A925D-6802-4F82-B3A4-43BDB522D203}" type="datetimeFigureOut">
               <a:rPr lang="en-GB" smtClean="0"/>
-              <a:t>22/07/2023</a:t>
+              <a:t>26/07/2023</a:t>
             </a:fld>
             <a:endParaRPr lang="en-GB"/>
           </a:p>
@@ -3456,7 +3457,7 @@
           <a:p>
             <a:fld id="{8B1A925D-6802-4F82-B3A4-43BDB522D203}" type="datetimeFigureOut">
               <a:rPr lang="en-GB" smtClean="0"/>
-              <a:t>22/07/2023</a:t>
+              <a:t>26/07/2023</a:t>
             </a:fld>
             <a:endParaRPr lang="en-GB"/>
           </a:p>
@@ -8644,6 +8645,3635 @@
       </p:grpSpPr>
       <p:cxnSp>
         <p:nvCxnSpPr>
+          <p:cNvPr id="351" name="Straight Connector 350">
+            <a:extLst>
+              <a:ext uri="{FF2B5EF4-FFF2-40B4-BE49-F238E27FC236}">
+                <a16:creationId xmlns:a16="http://schemas.microsoft.com/office/drawing/2014/main" id="{662F6D8C-F696-1EC7-A2A9-C2AC6E82D68C}"/>
+              </a:ext>
+            </a:extLst>
+          </p:cNvPr>
+          <p:cNvCxnSpPr>
+            <a:cxnSpLocks/>
+          </p:cNvCxnSpPr>
+          <p:nvPr/>
+        </p:nvCxnSpPr>
+        <p:spPr>
+          <a:xfrm>
+            <a:off x="89777" y="3030813"/>
+            <a:ext cx="5593847" cy="434793"/>
+          </a:xfrm>
+          <a:prstGeom prst="line">
+            <a:avLst/>
+          </a:prstGeom>
+          <a:ln w="63500">
+            <a:solidFill>
+              <a:srgbClr val="498F34"/>
+            </a:solidFill>
+          </a:ln>
+        </p:spPr>
+        <p:style>
+          <a:lnRef idx="1">
+            <a:schemeClr val="accent1"/>
+          </a:lnRef>
+          <a:fillRef idx="0">
+            <a:schemeClr val="accent1"/>
+          </a:fillRef>
+          <a:effectRef idx="0">
+            <a:schemeClr val="accent1"/>
+          </a:effectRef>
+          <a:fontRef idx="minor">
+            <a:schemeClr val="tx1"/>
+          </a:fontRef>
+        </p:style>
+      </p:cxnSp>
+      <p:sp>
+        <p:nvSpPr>
+          <p:cNvPr id="352" name="Freeform: Shape 351">
+            <a:extLst>
+              <a:ext uri="{FF2B5EF4-FFF2-40B4-BE49-F238E27FC236}">
+                <a16:creationId xmlns:a16="http://schemas.microsoft.com/office/drawing/2014/main" id="{C7F2FE3C-1C1B-74AC-F91E-906AE4AF9C59}"/>
+              </a:ext>
+            </a:extLst>
+          </p:cNvPr>
+          <p:cNvSpPr/>
+          <p:nvPr/>
+        </p:nvSpPr>
+        <p:spPr>
+          <a:xfrm>
+            <a:off x="5035612" y="3139548"/>
+            <a:ext cx="290611" cy="289881"/>
+          </a:xfrm>
+          <a:custGeom>
+            <a:avLst/>
+            <a:gdLst>
+              <a:gd name="connsiteX0" fmla="*/ 182077 w 413158"/>
+              <a:gd name="connsiteY0" fmla="*/ 355740 h 363000"/>
+              <a:gd name="connsiteX1" fmla="*/ 174820 w 413158"/>
+              <a:gd name="connsiteY1" fmla="*/ 285588 h 363000"/>
+              <a:gd name="connsiteX2" fmla="*/ 167563 w 413158"/>
+              <a:gd name="connsiteY2" fmla="*/ 271074 h 363000"/>
+              <a:gd name="connsiteX3" fmla="*/ 160306 w 413158"/>
+              <a:gd name="connsiteY3" fmla="*/ 254140 h 363000"/>
+              <a:gd name="connsiteX4" fmla="*/ 148211 w 413158"/>
+              <a:gd name="connsiteY4" fmla="*/ 237207 h 363000"/>
+              <a:gd name="connsiteX5" fmla="*/ 133697 w 413158"/>
+              <a:gd name="connsiteY5" fmla="*/ 222693 h 363000"/>
+              <a:gd name="connsiteX6" fmla="*/ 124020 w 413158"/>
+              <a:gd name="connsiteY6" fmla="*/ 217855 h 363000"/>
+              <a:gd name="connsiteX7" fmla="*/ 99830 w 413158"/>
+              <a:gd name="connsiteY7" fmla="*/ 213017 h 363000"/>
+              <a:gd name="connsiteX8" fmla="*/ 12744 w 413158"/>
+              <a:gd name="connsiteY8" fmla="*/ 215436 h 363000"/>
+              <a:gd name="connsiteX9" fmla="*/ 649 w 413158"/>
+              <a:gd name="connsiteY9" fmla="*/ 213017 h 363000"/>
+              <a:gd name="connsiteX10" fmla="*/ 3068 w 413158"/>
+              <a:gd name="connsiteY10" fmla="*/ 205759 h 363000"/>
+              <a:gd name="connsiteX11" fmla="*/ 24839 w 413158"/>
+              <a:gd name="connsiteY11" fmla="*/ 191245 h 363000"/>
+              <a:gd name="connsiteX12" fmla="*/ 65963 w 413158"/>
+              <a:gd name="connsiteY12" fmla="*/ 181569 h 363000"/>
+              <a:gd name="connsiteX13" fmla="*/ 169982 w 413158"/>
+              <a:gd name="connsiteY13" fmla="*/ 183988 h 363000"/>
+              <a:gd name="connsiteX14" fmla="*/ 201430 w 413158"/>
+              <a:gd name="connsiteY14" fmla="*/ 193664 h 363000"/>
+              <a:gd name="connsiteX15" fmla="*/ 208687 w 413158"/>
+              <a:gd name="connsiteY15" fmla="*/ 181569 h 363000"/>
+              <a:gd name="connsiteX16" fmla="*/ 206268 w 413158"/>
+              <a:gd name="connsiteY16" fmla="*/ 159798 h 363000"/>
+              <a:gd name="connsiteX17" fmla="*/ 201430 w 413158"/>
+              <a:gd name="connsiteY17" fmla="*/ 128350 h 363000"/>
+              <a:gd name="connsiteX18" fmla="*/ 179658 w 413158"/>
+              <a:gd name="connsiteY18" fmla="*/ 41264 h 363000"/>
+              <a:gd name="connsiteX19" fmla="*/ 174820 w 413158"/>
+              <a:gd name="connsiteY19" fmla="*/ 24331 h 363000"/>
+              <a:gd name="connsiteX20" fmla="*/ 167563 w 413158"/>
+              <a:gd name="connsiteY20" fmla="*/ 14655 h 363000"/>
+              <a:gd name="connsiteX21" fmla="*/ 160306 w 413158"/>
+              <a:gd name="connsiteY21" fmla="*/ 7398 h 363000"/>
+              <a:gd name="connsiteX22" fmla="*/ 155468 w 413158"/>
+              <a:gd name="connsiteY22" fmla="*/ 140 h 363000"/>
+              <a:gd name="connsiteX23" fmla="*/ 196592 w 413158"/>
+              <a:gd name="connsiteY23" fmla="*/ 29169 h 363000"/>
+              <a:gd name="connsiteX24" fmla="*/ 208687 w 413158"/>
+              <a:gd name="connsiteY24" fmla="*/ 36426 h 363000"/>
+              <a:gd name="connsiteX25" fmla="*/ 230458 w 413158"/>
+              <a:gd name="connsiteY25" fmla="*/ 55779 h 363000"/>
+              <a:gd name="connsiteX26" fmla="*/ 242554 w 413158"/>
+              <a:gd name="connsiteY26" fmla="*/ 72712 h 363000"/>
+              <a:gd name="connsiteX27" fmla="*/ 252230 w 413158"/>
+              <a:gd name="connsiteY27" fmla="*/ 84807 h 363000"/>
+              <a:gd name="connsiteX28" fmla="*/ 266744 w 413158"/>
+              <a:gd name="connsiteY28" fmla="*/ 106579 h 363000"/>
+              <a:gd name="connsiteX29" fmla="*/ 274001 w 413158"/>
+              <a:gd name="connsiteY29" fmla="*/ 130769 h 363000"/>
+              <a:gd name="connsiteX30" fmla="*/ 276420 w 413158"/>
+              <a:gd name="connsiteY30" fmla="*/ 145283 h 363000"/>
+              <a:gd name="connsiteX31" fmla="*/ 278839 w 413158"/>
+              <a:gd name="connsiteY31" fmla="*/ 157379 h 363000"/>
+              <a:gd name="connsiteX32" fmla="*/ 283677 w 413158"/>
+              <a:gd name="connsiteY32" fmla="*/ 183988 h 363000"/>
+              <a:gd name="connsiteX33" fmla="*/ 293354 w 413158"/>
+              <a:gd name="connsiteY33" fmla="*/ 169474 h 363000"/>
+              <a:gd name="connsiteX34" fmla="*/ 305449 w 413158"/>
+              <a:gd name="connsiteY34" fmla="*/ 162217 h 363000"/>
+              <a:gd name="connsiteX35" fmla="*/ 356249 w 413158"/>
+              <a:gd name="connsiteY35" fmla="*/ 128350 h 363000"/>
+              <a:gd name="connsiteX36" fmla="*/ 378020 w 413158"/>
+              <a:gd name="connsiteY36" fmla="*/ 121093 h 363000"/>
+              <a:gd name="connsiteX37" fmla="*/ 385277 w 413158"/>
+              <a:gd name="connsiteY37" fmla="*/ 118674 h 363000"/>
+              <a:gd name="connsiteX38" fmla="*/ 397373 w 413158"/>
+              <a:gd name="connsiteY38" fmla="*/ 128350 h 363000"/>
+              <a:gd name="connsiteX39" fmla="*/ 394954 w 413158"/>
+              <a:gd name="connsiteY39" fmla="*/ 147702 h 363000"/>
+              <a:gd name="connsiteX40" fmla="*/ 385277 w 413158"/>
+              <a:gd name="connsiteY40" fmla="*/ 167055 h 363000"/>
+              <a:gd name="connsiteX41" fmla="*/ 375601 w 413158"/>
+              <a:gd name="connsiteY41" fmla="*/ 188826 h 363000"/>
+              <a:gd name="connsiteX42" fmla="*/ 370763 w 413158"/>
+              <a:gd name="connsiteY42" fmla="*/ 196083 h 363000"/>
+              <a:gd name="connsiteX43" fmla="*/ 363506 w 413158"/>
+              <a:gd name="connsiteY43" fmla="*/ 217855 h 363000"/>
+              <a:gd name="connsiteX44" fmla="*/ 358668 w 413158"/>
+              <a:gd name="connsiteY44" fmla="*/ 227531 h 363000"/>
+              <a:gd name="connsiteX45" fmla="*/ 353830 w 413158"/>
+              <a:gd name="connsiteY45" fmla="*/ 244464 h 363000"/>
+              <a:gd name="connsiteX46" fmla="*/ 348992 w 413158"/>
+              <a:gd name="connsiteY46" fmla="*/ 251721 h 363000"/>
+              <a:gd name="connsiteX47" fmla="*/ 370763 w 413158"/>
+              <a:gd name="connsiteY47" fmla="*/ 249302 h 363000"/>
+              <a:gd name="connsiteX48" fmla="*/ 411887 w 413158"/>
+              <a:gd name="connsiteY48" fmla="*/ 251721 h 363000"/>
+              <a:gd name="connsiteX49" fmla="*/ 392535 w 413158"/>
+              <a:gd name="connsiteY49" fmla="*/ 266236 h 363000"/>
+              <a:gd name="connsiteX50" fmla="*/ 382858 w 413158"/>
+              <a:gd name="connsiteY50" fmla="*/ 273493 h 363000"/>
+              <a:gd name="connsiteX51" fmla="*/ 361087 w 413158"/>
+              <a:gd name="connsiteY51" fmla="*/ 290426 h 363000"/>
+              <a:gd name="connsiteX52" fmla="*/ 351411 w 413158"/>
+              <a:gd name="connsiteY52" fmla="*/ 304940 h 363000"/>
+              <a:gd name="connsiteX53" fmla="*/ 341735 w 413158"/>
+              <a:gd name="connsiteY53" fmla="*/ 326712 h 363000"/>
+              <a:gd name="connsiteX54" fmla="*/ 339316 w 413158"/>
+              <a:gd name="connsiteY54" fmla="*/ 336388 h 363000"/>
+              <a:gd name="connsiteX55" fmla="*/ 334477 w 413158"/>
+              <a:gd name="connsiteY55" fmla="*/ 362998 h 363000"/>
+            </a:gdLst>
+            <a:ahLst/>
+            <a:cxnLst>
+              <a:cxn ang="0">
+                <a:pos x="connsiteX0" y="connsiteY0"/>
+              </a:cxn>
+              <a:cxn ang="0">
+                <a:pos x="connsiteX1" y="connsiteY1"/>
+              </a:cxn>
+              <a:cxn ang="0">
+                <a:pos x="connsiteX2" y="connsiteY2"/>
+              </a:cxn>
+              <a:cxn ang="0">
+                <a:pos x="connsiteX3" y="connsiteY3"/>
+              </a:cxn>
+              <a:cxn ang="0">
+                <a:pos x="connsiteX4" y="connsiteY4"/>
+              </a:cxn>
+              <a:cxn ang="0">
+                <a:pos x="connsiteX5" y="connsiteY5"/>
+              </a:cxn>
+              <a:cxn ang="0">
+                <a:pos x="connsiteX6" y="connsiteY6"/>
+              </a:cxn>
+              <a:cxn ang="0">
+                <a:pos x="connsiteX7" y="connsiteY7"/>
+              </a:cxn>
+              <a:cxn ang="0">
+                <a:pos x="connsiteX8" y="connsiteY8"/>
+              </a:cxn>
+              <a:cxn ang="0">
+                <a:pos x="connsiteX9" y="connsiteY9"/>
+              </a:cxn>
+              <a:cxn ang="0">
+                <a:pos x="connsiteX10" y="connsiteY10"/>
+              </a:cxn>
+              <a:cxn ang="0">
+                <a:pos x="connsiteX11" y="connsiteY11"/>
+              </a:cxn>
+              <a:cxn ang="0">
+                <a:pos x="connsiteX12" y="connsiteY12"/>
+              </a:cxn>
+              <a:cxn ang="0">
+                <a:pos x="connsiteX13" y="connsiteY13"/>
+              </a:cxn>
+              <a:cxn ang="0">
+                <a:pos x="connsiteX14" y="connsiteY14"/>
+              </a:cxn>
+              <a:cxn ang="0">
+                <a:pos x="connsiteX15" y="connsiteY15"/>
+              </a:cxn>
+              <a:cxn ang="0">
+                <a:pos x="connsiteX16" y="connsiteY16"/>
+              </a:cxn>
+              <a:cxn ang="0">
+                <a:pos x="connsiteX17" y="connsiteY17"/>
+              </a:cxn>
+              <a:cxn ang="0">
+                <a:pos x="connsiteX18" y="connsiteY18"/>
+              </a:cxn>
+              <a:cxn ang="0">
+                <a:pos x="connsiteX19" y="connsiteY19"/>
+              </a:cxn>
+              <a:cxn ang="0">
+                <a:pos x="connsiteX20" y="connsiteY20"/>
+              </a:cxn>
+              <a:cxn ang="0">
+                <a:pos x="connsiteX21" y="connsiteY21"/>
+              </a:cxn>
+              <a:cxn ang="0">
+                <a:pos x="connsiteX22" y="connsiteY22"/>
+              </a:cxn>
+              <a:cxn ang="0">
+                <a:pos x="connsiteX23" y="connsiteY23"/>
+              </a:cxn>
+              <a:cxn ang="0">
+                <a:pos x="connsiteX24" y="connsiteY24"/>
+              </a:cxn>
+              <a:cxn ang="0">
+                <a:pos x="connsiteX25" y="connsiteY25"/>
+              </a:cxn>
+              <a:cxn ang="0">
+                <a:pos x="connsiteX26" y="connsiteY26"/>
+              </a:cxn>
+              <a:cxn ang="0">
+                <a:pos x="connsiteX27" y="connsiteY27"/>
+              </a:cxn>
+              <a:cxn ang="0">
+                <a:pos x="connsiteX28" y="connsiteY28"/>
+              </a:cxn>
+              <a:cxn ang="0">
+                <a:pos x="connsiteX29" y="connsiteY29"/>
+              </a:cxn>
+              <a:cxn ang="0">
+                <a:pos x="connsiteX30" y="connsiteY30"/>
+              </a:cxn>
+              <a:cxn ang="0">
+                <a:pos x="connsiteX31" y="connsiteY31"/>
+              </a:cxn>
+              <a:cxn ang="0">
+                <a:pos x="connsiteX32" y="connsiteY32"/>
+              </a:cxn>
+              <a:cxn ang="0">
+                <a:pos x="connsiteX33" y="connsiteY33"/>
+              </a:cxn>
+              <a:cxn ang="0">
+                <a:pos x="connsiteX34" y="connsiteY34"/>
+              </a:cxn>
+              <a:cxn ang="0">
+                <a:pos x="connsiteX35" y="connsiteY35"/>
+              </a:cxn>
+              <a:cxn ang="0">
+                <a:pos x="connsiteX36" y="connsiteY36"/>
+              </a:cxn>
+              <a:cxn ang="0">
+                <a:pos x="connsiteX37" y="connsiteY37"/>
+              </a:cxn>
+              <a:cxn ang="0">
+                <a:pos x="connsiteX38" y="connsiteY38"/>
+              </a:cxn>
+              <a:cxn ang="0">
+                <a:pos x="connsiteX39" y="connsiteY39"/>
+              </a:cxn>
+              <a:cxn ang="0">
+                <a:pos x="connsiteX40" y="connsiteY40"/>
+              </a:cxn>
+              <a:cxn ang="0">
+                <a:pos x="connsiteX41" y="connsiteY41"/>
+              </a:cxn>
+              <a:cxn ang="0">
+                <a:pos x="connsiteX42" y="connsiteY42"/>
+              </a:cxn>
+              <a:cxn ang="0">
+                <a:pos x="connsiteX43" y="connsiteY43"/>
+              </a:cxn>
+              <a:cxn ang="0">
+                <a:pos x="connsiteX44" y="connsiteY44"/>
+              </a:cxn>
+              <a:cxn ang="0">
+                <a:pos x="connsiteX45" y="connsiteY45"/>
+              </a:cxn>
+              <a:cxn ang="0">
+                <a:pos x="connsiteX46" y="connsiteY46"/>
+              </a:cxn>
+              <a:cxn ang="0">
+                <a:pos x="connsiteX47" y="connsiteY47"/>
+              </a:cxn>
+              <a:cxn ang="0">
+                <a:pos x="connsiteX48" y="connsiteY48"/>
+              </a:cxn>
+              <a:cxn ang="0">
+                <a:pos x="connsiteX49" y="connsiteY49"/>
+              </a:cxn>
+              <a:cxn ang="0">
+                <a:pos x="connsiteX50" y="connsiteY50"/>
+              </a:cxn>
+              <a:cxn ang="0">
+                <a:pos x="connsiteX51" y="connsiteY51"/>
+              </a:cxn>
+              <a:cxn ang="0">
+                <a:pos x="connsiteX52" y="connsiteY52"/>
+              </a:cxn>
+              <a:cxn ang="0">
+                <a:pos x="connsiteX53" y="connsiteY53"/>
+              </a:cxn>
+              <a:cxn ang="0">
+                <a:pos x="connsiteX54" y="connsiteY54"/>
+              </a:cxn>
+              <a:cxn ang="0">
+                <a:pos x="connsiteX55" y="connsiteY55"/>
+              </a:cxn>
+            </a:cxnLst>
+            <a:rect l="l" t="t" r="r" b="b"/>
+            <a:pathLst>
+              <a:path w="413158" h="363000">
+                <a:moveTo>
+                  <a:pt x="182077" y="355740"/>
+                </a:moveTo>
+                <a:cubicBezTo>
+                  <a:pt x="179658" y="332356"/>
+                  <a:pt x="185333" y="306615"/>
+                  <a:pt x="174820" y="285588"/>
+                </a:cubicBezTo>
+                <a:cubicBezTo>
+                  <a:pt x="172401" y="280750"/>
+                  <a:pt x="169830" y="275985"/>
+                  <a:pt x="167563" y="271074"/>
+                </a:cubicBezTo>
+                <a:cubicBezTo>
+                  <a:pt x="164990" y="265498"/>
+                  <a:pt x="163052" y="259633"/>
+                  <a:pt x="160306" y="254140"/>
+                </a:cubicBezTo>
+                <a:cubicBezTo>
+                  <a:pt x="158406" y="250340"/>
+                  <a:pt x="150037" y="239763"/>
+                  <a:pt x="148211" y="237207"/>
+                </a:cubicBezTo>
+                <a:cubicBezTo>
+                  <a:pt x="141620" y="227980"/>
+                  <a:pt x="145028" y="229775"/>
+                  <a:pt x="133697" y="222693"/>
+                </a:cubicBezTo>
+                <a:cubicBezTo>
+                  <a:pt x="130639" y="220782"/>
+                  <a:pt x="127397" y="219121"/>
+                  <a:pt x="124020" y="217855"/>
+                </a:cubicBezTo>
+                <a:cubicBezTo>
+                  <a:pt x="118246" y="215690"/>
+                  <a:pt x="104847" y="213853"/>
+                  <a:pt x="99830" y="213017"/>
+                </a:cubicBezTo>
+                <a:cubicBezTo>
+                  <a:pt x="70801" y="213823"/>
+                  <a:pt x="41784" y="215436"/>
+                  <a:pt x="12744" y="215436"/>
+                </a:cubicBezTo>
+                <a:cubicBezTo>
+                  <a:pt x="8632" y="215436"/>
+                  <a:pt x="3556" y="215924"/>
+                  <a:pt x="649" y="213017"/>
+                </a:cubicBezTo>
+                <a:cubicBezTo>
+                  <a:pt x="-1154" y="211214"/>
+                  <a:pt x="1173" y="207465"/>
+                  <a:pt x="3068" y="205759"/>
+                </a:cubicBezTo>
+                <a:cubicBezTo>
+                  <a:pt x="9551" y="199924"/>
+                  <a:pt x="16378" y="193360"/>
+                  <a:pt x="24839" y="191245"/>
+                </a:cubicBezTo>
+                <a:cubicBezTo>
+                  <a:pt x="51404" y="184604"/>
+                  <a:pt x="37701" y="187849"/>
+                  <a:pt x="65963" y="181569"/>
+                </a:cubicBezTo>
+                <a:cubicBezTo>
+                  <a:pt x="100636" y="182375"/>
+                  <a:pt x="135362" y="181911"/>
+                  <a:pt x="169982" y="183988"/>
+                </a:cubicBezTo>
+                <a:cubicBezTo>
+                  <a:pt x="173788" y="184216"/>
+                  <a:pt x="197011" y="192191"/>
+                  <a:pt x="201430" y="193664"/>
+                </a:cubicBezTo>
+                <a:cubicBezTo>
+                  <a:pt x="203849" y="189632"/>
+                  <a:pt x="208022" y="186223"/>
+                  <a:pt x="208687" y="181569"/>
+                </a:cubicBezTo>
+                <a:cubicBezTo>
+                  <a:pt x="209720" y="174341"/>
+                  <a:pt x="207255" y="167033"/>
+                  <a:pt x="206268" y="159798"/>
+                </a:cubicBezTo>
+                <a:cubicBezTo>
+                  <a:pt x="204835" y="149289"/>
+                  <a:pt x="203402" y="138771"/>
+                  <a:pt x="201430" y="128350"/>
+                </a:cubicBezTo>
+                <a:cubicBezTo>
+                  <a:pt x="187595" y="55223"/>
+                  <a:pt x="195411" y="91670"/>
+                  <a:pt x="179658" y="41264"/>
+                </a:cubicBezTo>
+                <a:cubicBezTo>
+                  <a:pt x="178845" y="38664"/>
+                  <a:pt x="176584" y="27418"/>
+                  <a:pt x="174820" y="24331"/>
+                </a:cubicBezTo>
+                <a:cubicBezTo>
+                  <a:pt x="172820" y="20831"/>
+                  <a:pt x="170187" y="17716"/>
+                  <a:pt x="167563" y="14655"/>
+                </a:cubicBezTo>
+                <a:cubicBezTo>
+                  <a:pt x="165337" y="12058"/>
+                  <a:pt x="162496" y="10026"/>
+                  <a:pt x="160306" y="7398"/>
+                </a:cubicBezTo>
+                <a:cubicBezTo>
+                  <a:pt x="158445" y="5164"/>
+                  <a:pt x="152796" y="-1005"/>
+                  <a:pt x="155468" y="140"/>
+                </a:cubicBezTo>
+                <a:cubicBezTo>
+                  <a:pt x="169299" y="6068"/>
+                  <a:pt x="183805" y="21497"/>
+                  <a:pt x="196592" y="29169"/>
+                </a:cubicBezTo>
+                <a:cubicBezTo>
+                  <a:pt x="200624" y="31588"/>
+                  <a:pt x="204835" y="33730"/>
+                  <a:pt x="208687" y="36426"/>
+                </a:cubicBezTo>
+                <a:cubicBezTo>
+                  <a:pt x="214930" y="40796"/>
+                  <a:pt x="225448" y="49656"/>
+                  <a:pt x="230458" y="55779"/>
+                </a:cubicBezTo>
+                <a:cubicBezTo>
+                  <a:pt x="234850" y="61148"/>
+                  <a:pt x="238392" y="67163"/>
+                  <a:pt x="242554" y="72712"/>
+                </a:cubicBezTo>
+                <a:cubicBezTo>
+                  <a:pt x="245652" y="76842"/>
+                  <a:pt x="249229" y="80606"/>
+                  <a:pt x="252230" y="84807"/>
+                </a:cubicBezTo>
+                <a:cubicBezTo>
+                  <a:pt x="257300" y="91905"/>
+                  <a:pt x="266744" y="106579"/>
+                  <a:pt x="266744" y="106579"/>
+                </a:cubicBezTo>
+                <a:cubicBezTo>
+                  <a:pt x="275288" y="149299"/>
+                  <a:pt x="262067" y="87010"/>
+                  <a:pt x="274001" y="130769"/>
+                </a:cubicBezTo>
+                <a:cubicBezTo>
+                  <a:pt x="275292" y="135501"/>
+                  <a:pt x="275543" y="140457"/>
+                  <a:pt x="276420" y="145283"/>
+                </a:cubicBezTo>
+                <a:cubicBezTo>
+                  <a:pt x="277156" y="149329"/>
+                  <a:pt x="278103" y="153333"/>
+                  <a:pt x="278839" y="157379"/>
+                </a:cubicBezTo>
+                <a:cubicBezTo>
+                  <a:pt x="285026" y="191410"/>
+                  <a:pt x="277704" y="154122"/>
+                  <a:pt x="283677" y="183988"/>
+                </a:cubicBezTo>
+                <a:cubicBezTo>
+                  <a:pt x="286903" y="179150"/>
+                  <a:pt x="289242" y="173586"/>
+                  <a:pt x="293354" y="169474"/>
+                </a:cubicBezTo>
+                <a:cubicBezTo>
+                  <a:pt x="296679" y="166149"/>
+                  <a:pt x="301647" y="164982"/>
+                  <a:pt x="305449" y="162217"/>
+                </a:cubicBezTo>
+                <a:cubicBezTo>
+                  <a:pt x="325028" y="147977"/>
+                  <a:pt x="327488" y="137937"/>
+                  <a:pt x="356249" y="128350"/>
+                </a:cubicBezTo>
+                <a:lnTo>
+                  <a:pt x="378020" y="121093"/>
+                </a:lnTo>
+                <a:lnTo>
+                  <a:pt x="385277" y="118674"/>
+                </a:lnTo>
+                <a:cubicBezTo>
+                  <a:pt x="389309" y="121899"/>
+                  <a:pt x="395740" y="123452"/>
+                  <a:pt x="397373" y="128350"/>
+                </a:cubicBezTo>
+                <a:cubicBezTo>
+                  <a:pt x="399429" y="134517"/>
+                  <a:pt x="396416" y="141368"/>
+                  <a:pt x="394954" y="147702"/>
+                </a:cubicBezTo>
+                <a:cubicBezTo>
+                  <a:pt x="392865" y="156756"/>
+                  <a:pt x="389962" y="160029"/>
+                  <a:pt x="385277" y="167055"/>
+                </a:cubicBezTo>
+                <a:cubicBezTo>
+                  <a:pt x="381807" y="177464"/>
+                  <a:pt x="382599" y="176230"/>
+                  <a:pt x="375601" y="188826"/>
+                </a:cubicBezTo>
+                <a:cubicBezTo>
+                  <a:pt x="374189" y="191367"/>
+                  <a:pt x="372063" y="193483"/>
+                  <a:pt x="370763" y="196083"/>
+                </a:cubicBezTo>
+                <a:cubicBezTo>
+                  <a:pt x="360174" y="217261"/>
+                  <a:pt x="370436" y="199376"/>
+                  <a:pt x="363506" y="217855"/>
+                </a:cubicBezTo>
+                <a:cubicBezTo>
+                  <a:pt x="362240" y="221231"/>
+                  <a:pt x="359934" y="224155"/>
+                  <a:pt x="358668" y="227531"/>
+                </a:cubicBezTo>
+                <a:cubicBezTo>
+                  <a:pt x="356343" y="233731"/>
+                  <a:pt x="356754" y="238616"/>
+                  <a:pt x="353830" y="244464"/>
+                </a:cubicBezTo>
+                <a:cubicBezTo>
+                  <a:pt x="352530" y="247064"/>
+                  <a:pt x="346197" y="250922"/>
+                  <a:pt x="348992" y="251721"/>
+                </a:cubicBezTo>
+                <a:cubicBezTo>
+                  <a:pt x="356013" y="253727"/>
+                  <a:pt x="363506" y="250108"/>
+                  <a:pt x="370763" y="249302"/>
+                </a:cubicBezTo>
+                <a:cubicBezTo>
+                  <a:pt x="384471" y="250108"/>
+                  <a:pt x="401048" y="243290"/>
+                  <a:pt x="411887" y="251721"/>
+                </a:cubicBezTo>
+                <a:cubicBezTo>
+                  <a:pt x="418252" y="256672"/>
+                  <a:pt x="398986" y="261398"/>
+                  <a:pt x="392535" y="266236"/>
+                </a:cubicBezTo>
+                <a:cubicBezTo>
+                  <a:pt x="389309" y="268655"/>
+                  <a:pt x="386315" y="271419"/>
+                  <a:pt x="382858" y="273493"/>
+                </a:cubicBezTo>
+                <a:cubicBezTo>
+                  <a:pt x="372006" y="280004"/>
+                  <a:pt x="369087" y="280426"/>
+                  <a:pt x="361087" y="290426"/>
+                </a:cubicBezTo>
+                <a:cubicBezTo>
+                  <a:pt x="357455" y="294966"/>
+                  <a:pt x="351411" y="304940"/>
+                  <a:pt x="351411" y="304940"/>
+                </a:cubicBezTo>
+                <a:cubicBezTo>
+                  <a:pt x="345654" y="322213"/>
+                  <a:pt x="349402" y="315212"/>
+                  <a:pt x="341735" y="326712"/>
+                </a:cubicBezTo>
+                <a:cubicBezTo>
+                  <a:pt x="340929" y="329937"/>
+                  <a:pt x="339755" y="333093"/>
+                  <a:pt x="339316" y="336388"/>
+                </a:cubicBezTo>
+                <a:cubicBezTo>
+                  <a:pt x="335661" y="363801"/>
+                  <a:pt x="345909" y="362998"/>
+                  <a:pt x="334477" y="362998"/>
+                </a:cubicBezTo>
+              </a:path>
+            </a:pathLst>
+          </a:custGeom>
+          <a:solidFill>
+            <a:srgbClr val="498F34"/>
+          </a:solidFill>
+          <a:ln>
+            <a:solidFill>
+              <a:srgbClr val="498F34"/>
+            </a:solidFill>
+          </a:ln>
+        </p:spPr>
+        <p:style>
+          <a:lnRef idx="2">
+            <a:schemeClr val="accent1">
+              <a:shade val="50000"/>
+            </a:schemeClr>
+          </a:lnRef>
+          <a:fillRef idx="1">
+            <a:schemeClr val="accent1"/>
+          </a:fillRef>
+          <a:effectRef idx="0">
+            <a:schemeClr val="accent1"/>
+          </a:effectRef>
+          <a:fontRef idx="minor">
+            <a:schemeClr val="lt1"/>
+          </a:fontRef>
+        </p:style>
+        <p:txBody>
+          <a:bodyPr rtlCol="0" anchor="ctr"/>
+          <a:lstStyle/>
+          <a:p>
+            <a:pPr algn="ctr"/>
+            <a:endParaRPr lang="en-GB"/>
+          </a:p>
+        </p:txBody>
+      </p:sp>
+      <p:sp>
+        <p:nvSpPr>
+          <p:cNvPr id="346" name="Partial Circle 345">
+            <a:extLst>
+              <a:ext uri="{FF2B5EF4-FFF2-40B4-BE49-F238E27FC236}">
+                <a16:creationId xmlns:a16="http://schemas.microsoft.com/office/drawing/2014/main" id="{9B6AD025-AB41-95FB-085E-9384E89565A5}"/>
+              </a:ext>
+            </a:extLst>
+          </p:cNvPr>
+          <p:cNvSpPr/>
+          <p:nvPr/>
+        </p:nvSpPr>
+        <p:spPr>
+          <a:xfrm rot="9512104">
+            <a:off x="3073391" y="2505312"/>
+            <a:ext cx="576000" cy="576000"/>
+          </a:xfrm>
+          <a:prstGeom prst="pie">
+            <a:avLst>
+              <a:gd name="adj1" fmla="val 1286739"/>
+              <a:gd name="adj2" fmla="val 4755907"/>
+            </a:avLst>
+          </a:prstGeom>
+          <a:solidFill>
+            <a:srgbClr val="BDBDBD"/>
+          </a:solidFill>
+          <a:ln>
+            <a:noFill/>
+          </a:ln>
+        </p:spPr>
+        <p:style>
+          <a:lnRef idx="2">
+            <a:schemeClr val="accent1">
+              <a:shade val="50000"/>
+            </a:schemeClr>
+          </a:lnRef>
+          <a:fillRef idx="1">
+            <a:schemeClr val="accent1"/>
+          </a:fillRef>
+          <a:effectRef idx="0">
+            <a:schemeClr val="accent1"/>
+          </a:effectRef>
+          <a:fontRef idx="minor">
+            <a:schemeClr val="lt1"/>
+          </a:fontRef>
+        </p:style>
+        <p:txBody>
+          <a:bodyPr rtlCol="0" anchor="ctr"/>
+          <a:lstStyle/>
+          <a:p>
+            <a:pPr algn="ctr"/>
+            <a:endParaRPr lang="en-GB">
+              <a:solidFill>
+                <a:schemeClr val="tx1"/>
+              </a:solidFill>
+            </a:endParaRPr>
+          </a:p>
+        </p:txBody>
+      </p:sp>
+      <p:sp>
+        <p:nvSpPr>
+          <p:cNvPr id="340" name="Partial Circle 339">
+            <a:extLst>
+              <a:ext uri="{FF2B5EF4-FFF2-40B4-BE49-F238E27FC236}">
+                <a16:creationId xmlns:a16="http://schemas.microsoft.com/office/drawing/2014/main" id="{BE0F8A6D-91A2-8BBA-008B-E8226F5F4262}"/>
+              </a:ext>
+            </a:extLst>
+          </p:cNvPr>
+          <p:cNvSpPr/>
+          <p:nvPr/>
+        </p:nvSpPr>
+        <p:spPr>
+          <a:xfrm rot="18395117">
+            <a:off x="-25711" y="2675035"/>
+            <a:ext cx="648000" cy="648000"/>
+          </a:xfrm>
+          <a:prstGeom prst="pie">
+            <a:avLst>
+              <a:gd name="adj1" fmla="val 1286739"/>
+              <a:gd name="adj2" fmla="val 3246341"/>
+            </a:avLst>
+          </a:prstGeom>
+          <a:solidFill>
+            <a:srgbClr val="BDBDBD"/>
+          </a:solidFill>
+          <a:ln>
+            <a:noFill/>
+          </a:ln>
+        </p:spPr>
+        <p:style>
+          <a:lnRef idx="2">
+            <a:schemeClr val="accent1">
+              <a:shade val="50000"/>
+            </a:schemeClr>
+          </a:lnRef>
+          <a:fillRef idx="1">
+            <a:schemeClr val="accent1"/>
+          </a:fillRef>
+          <a:effectRef idx="0">
+            <a:schemeClr val="accent1"/>
+          </a:effectRef>
+          <a:fontRef idx="minor">
+            <a:schemeClr val="lt1"/>
+          </a:fontRef>
+        </p:style>
+        <p:txBody>
+          <a:bodyPr rtlCol="0" anchor="ctr"/>
+          <a:lstStyle/>
+          <a:p>
+            <a:pPr algn="ctr"/>
+            <a:endParaRPr lang="en-GB">
+              <a:solidFill>
+                <a:schemeClr val="tx1"/>
+              </a:solidFill>
+            </a:endParaRPr>
+          </a:p>
+        </p:txBody>
+      </p:sp>
+      <p:cxnSp>
+        <p:nvCxnSpPr>
+          <p:cNvPr id="82" name="Straight Arrow Connector 81">
+            <a:extLst>
+              <a:ext uri="{FF2B5EF4-FFF2-40B4-BE49-F238E27FC236}">
+                <a16:creationId xmlns:a16="http://schemas.microsoft.com/office/drawing/2014/main" id="{90B00F2E-AA6F-07CC-AF46-564E9C4CCA87}"/>
+              </a:ext>
+            </a:extLst>
+          </p:cNvPr>
+          <p:cNvCxnSpPr>
+            <a:cxnSpLocks/>
+          </p:cNvCxnSpPr>
+          <p:nvPr/>
+        </p:nvCxnSpPr>
+        <p:spPr>
+          <a:xfrm flipH="1">
+            <a:off x="1121513" y="2546299"/>
+            <a:ext cx="2313" cy="1453686"/>
+          </a:xfrm>
+          <a:prstGeom prst="straightConnector1">
+            <a:avLst/>
+          </a:prstGeom>
+          <a:ln w="25400">
+            <a:solidFill>
+              <a:schemeClr val="tx1"/>
+            </a:solidFill>
+            <a:prstDash val="dash"/>
+            <a:headEnd type="none" w="sm" len="sm"/>
+            <a:tailEnd type="none" w="sm" len="sm"/>
+          </a:ln>
+        </p:spPr>
+        <p:style>
+          <a:lnRef idx="1">
+            <a:schemeClr val="accent1"/>
+          </a:lnRef>
+          <a:fillRef idx="0">
+            <a:schemeClr val="accent1"/>
+          </a:fillRef>
+          <a:effectRef idx="0">
+            <a:schemeClr val="accent1"/>
+          </a:effectRef>
+          <a:fontRef idx="minor">
+            <a:schemeClr val="tx1"/>
+          </a:fontRef>
+        </p:style>
+      </p:cxnSp>
+      <p:cxnSp>
+        <p:nvCxnSpPr>
+          <p:cNvPr id="104" name="Straight Arrow Connector 103">
+            <a:extLst>
+              <a:ext uri="{FF2B5EF4-FFF2-40B4-BE49-F238E27FC236}">
+                <a16:creationId xmlns:a16="http://schemas.microsoft.com/office/drawing/2014/main" id="{8F1BDDCB-43C8-E973-78C5-81C8EBD5DA86}"/>
+              </a:ext>
+            </a:extLst>
+          </p:cNvPr>
+          <p:cNvCxnSpPr>
+            <a:cxnSpLocks/>
+          </p:cNvCxnSpPr>
+          <p:nvPr/>
+        </p:nvCxnSpPr>
+        <p:spPr>
+          <a:xfrm rot="5400000">
+            <a:off x="2777416" y="3391960"/>
+            <a:ext cx="1152000" cy="0"/>
+          </a:xfrm>
+          <a:prstGeom prst="straightConnector1">
+            <a:avLst/>
+          </a:prstGeom>
+          <a:ln w="25400">
+            <a:solidFill>
+              <a:schemeClr val="tx1"/>
+            </a:solidFill>
+            <a:prstDash val="dash"/>
+            <a:headEnd type="none" w="sm" len="sm"/>
+            <a:tailEnd type="none" w="sm" len="sm"/>
+          </a:ln>
+        </p:spPr>
+        <p:style>
+          <a:lnRef idx="1">
+            <a:schemeClr val="accent1"/>
+          </a:lnRef>
+          <a:fillRef idx="0">
+            <a:schemeClr val="accent1"/>
+          </a:fillRef>
+          <a:effectRef idx="0">
+            <a:schemeClr val="accent1"/>
+          </a:effectRef>
+          <a:fontRef idx="minor">
+            <a:schemeClr val="tx1"/>
+          </a:fontRef>
+        </p:style>
+      </p:cxnSp>
+      <p:grpSp>
+        <p:nvGrpSpPr>
+          <p:cNvPr id="53" name="Group 52">
+            <a:extLst>
+              <a:ext uri="{FF2B5EF4-FFF2-40B4-BE49-F238E27FC236}">
+                <a16:creationId xmlns:a16="http://schemas.microsoft.com/office/drawing/2014/main" id="{6666805A-F20A-D583-CB9B-FAB64C0E19F7}"/>
+              </a:ext>
+            </a:extLst>
+          </p:cNvPr>
+          <p:cNvGrpSpPr/>
+          <p:nvPr/>
+        </p:nvGrpSpPr>
+        <p:grpSpPr>
+          <a:xfrm>
+            <a:off x="984777" y="2069063"/>
+            <a:ext cx="1800000" cy="936000"/>
+            <a:chOff x="2101198" y="4355074"/>
+            <a:chExt cx="1800000" cy="936000"/>
+          </a:xfrm>
+        </p:grpSpPr>
+        <p:cxnSp>
+          <p:nvCxnSpPr>
+            <p:cNvPr id="8" name="Straight Connector 7">
+              <a:extLst>
+                <a:ext uri="{FF2B5EF4-FFF2-40B4-BE49-F238E27FC236}">
+                  <a16:creationId xmlns:a16="http://schemas.microsoft.com/office/drawing/2014/main" id="{BF3FB08C-A341-7D83-66D6-7F886095657E}"/>
+                </a:ext>
+              </a:extLst>
+            </p:cNvPr>
+            <p:cNvCxnSpPr>
+              <a:cxnSpLocks/>
+            </p:cNvCxnSpPr>
+            <p:nvPr/>
+          </p:nvCxnSpPr>
+          <p:spPr>
+            <a:xfrm>
+              <a:off x="3047378" y="4355074"/>
+              <a:ext cx="0" cy="936000"/>
+            </a:xfrm>
+            <a:prstGeom prst="line">
+              <a:avLst/>
+            </a:prstGeom>
+            <a:ln w="76200">
+              <a:solidFill>
+                <a:schemeClr val="bg2">
+                  <a:lumMod val="50000"/>
+                </a:schemeClr>
+              </a:solidFill>
+            </a:ln>
+          </p:spPr>
+          <p:style>
+            <a:lnRef idx="1">
+              <a:schemeClr val="accent1"/>
+            </a:lnRef>
+            <a:fillRef idx="0">
+              <a:schemeClr val="accent1"/>
+            </a:fillRef>
+            <a:effectRef idx="0">
+              <a:schemeClr val="accent1"/>
+            </a:effectRef>
+            <a:fontRef idx="minor">
+              <a:schemeClr val="tx1"/>
+            </a:fontRef>
+          </p:style>
+        </p:cxnSp>
+        <p:cxnSp>
+          <p:nvCxnSpPr>
+            <p:cNvPr id="11" name="Straight Connector 10">
+              <a:extLst>
+                <a:ext uri="{FF2B5EF4-FFF2-40B4-BE49-F238E27FC236}">
+                  <a16:creationId xmlns:a16="http://schemas.microsoft.com/office/drawing/2014/main" id="{B6065B06-BAEC-D773-D2F4-EA7A61EBFF8A}"/>
+                </a:ext>
+              </a:extLst>
+            </p:cNvPr>
+            <p:cNvCxnSpPr>
+              <a:cxnSpLocks/>
+            </p:cNvCxnSpPr>
+            <p:nvPr/>
+          </p:nvCxnSpPr>
+          <p:spPr>
+            <a:xfrm rot="3600000">
+              <a:off x="3001198" y="3464310"/>
+              <a:ext cx="0" cy="1800000"/>
+            </a:xfrm>
+            <a:prstGeom prst="line">
+              <a:avLst/>
+            </a:prstGeom>
+            <a:ln w="76200">
+              <a:solidFill>
+                <a:srgbClr val="4472C4"/>
+              </a:solidFill>
+            </a:ln>
+          </p:spPr>
+          <p:style>
+            <a:lnRef idx="1">
+              <a:schemeClr val="accent1"/>
+            </a:lnRef>
+            <a:fillRef idx="0">
+              <a:schemeClr val="accent1"/>
+            </a:fillRef>
+            <a:effectRef idx="0">
+              <a:schemeClr val="accent1"/>
+            </a:effectRef>
+            <a:fontRef idx="minor">
+              <a:schemeClr val="tx1"/>
+            </a:fontRef>
+          </p:style>
+        </p:cxnSp>
+      </p:grpSp>
+      <p:cxnSp>
+        <p:nvCxnSpPr>
+          <p:cNvPr id="40" name="Straight Arrow Connector 39">
+            <a:extLst>
+              <a:ext uri="{FF2B5EF4-FFF2-40B4-BE49-F238E27FC236}">
+                <a16:creationId xmlns:a16="http://schemas.microsoft.com/office/drawing/2014/main" id="{ABECE04F-0D45-FB30-921A-58532F8F80F6}"/>
+              </a:ext>
+            </a:extLst>
+          </p:cNvPr>
+          <p:cNvCxnSpPr>
+            <a:cxnSpLocks/>
+          </p:cNvCxnSpPr>
+          <p:nvPr/>
+        </p:nvCxnSpPr>
+        <p:spPr>
+          <a:xfrm rot="-1800000">
+            <a:off x="898457" y="1952405"/>
+            <a:ext cx="1800000" cy="0"/>
+          </a:xfrm>
+          <a:prstGeom prst="straightConnector1">
+            <a:avLst/>
+          </a:prstGeom>
+          <a:ln w="15875">
+            <a:solidFill>
+              <a:schemeClr val="tx1"/>
+            </a:solidFill>
+            <a:headEnd type="arrow" w="sm" len="sm"/>
+            <a:tailEnd type="arrow" w="sm" len="sm"/>
+          </a:ln>
+        </p:spPr>
+        <p:style>
+          <a:lnRef idx="1">
+            <a:schemeClr val="accent1"/>
+          </a:lnRef>
+          <a:fillRef idx="0">
+            <a:schemeClr val="accent1"/>
+          </a:fillRef>
+          <a:effectRef idx="0">
+            <a:schemeClr val="accent1"/>
+          </a:effectRef>
+          <a:fontRef idx="minor">
+            <a:schemeClr val="tx1"/>
+          </a:fontRef>
+        </p:style>
+      </p:cxnSp>
+      <p:cxnSp>
+        <p:nvCxnSpPr>
+          <p:cNvPr id="47" name="Straight Arrow Connector 46">
+            <a:extLst>
+              <a:ext uri="{FF2B5EF4-FFF2-40B4-BE49-F238E27FC236}">
+                <a16:creationId xmlns:a16="http://schemas.microsoft.com/office/drawing/2014/main" id="{5A517711-2526-4DD8-10B2-7E380894EEFB}"/>
+              </a:ext>
+            </a:extLst>
+          </p:cNvPr>
+          <p:cNvCxnSpPr>
+            <a:cxnSpLocks/>
+          </p:cNvCxnSpPr>
+          <p:nvPr/>
+        </p:nvCxnSpPr>
+        <p:spPr>
+          <a:xfrm>
+            <a:off x="1105354" y="3491569"/>
+            <a:ext cx="1548000" cy="0"/>
+          </a:xfrm>
+          <a:prstGeom prst="straightConnector1">
+            <a:avLst/>
+          </a:prstGeom>
+          <a:ln w="25400">
+            <a:solidFill>
+              <a:schemeClr val="tx1"/>
+            </a:solidFill>
+            <a:headEnd type="arrow" w="sm" len="sm"/>
+            <a:tailEnd type="arrow" w="sm" len="sm"/>
+          </a:ln>
+        </p:spPr>
+        <p:style>
+          <a:lnRef idx="1">
+            <a:schemeClr val="accent1"/>
+          </a:lnRef>
+          <a:fillRef idx="0">
+            <a:schemeClr val="accent1"/>
+          </a:fillRef>
+          <a:effectRef idx="0">
+            <a:schemeClr val="accent1"/>
+          </a:effectRef>
+          <a:fontRef idx="minor">
+            <a:schemeClr val="tx1"/>
+          </a:fontRef>
+        </p:style>
+      </p:cxnSp>
+      <p:grpSp>
+        <p:nvGrpSpPr>
+          <p:cNvPr id="54" name="Group 53">
+            <a:extLst>
+              <a:ext uri="{FF2B5EF4-FFF2-40B4-BE49-F238E27FC236}">
+                <a16:creationId xmlns:a16="http://schemas.microsoft.com/office/drawing/2014/main" id="{75E2A0CA-D460-D7CE-BBB6-39EE8E46E622}"/>
+              </a:ext>
+            </a:extLst>
+          </p:cNvPr>
+          <p:cNvGrpSpPr/>
+          <p:nvPr/>
+        </p:nvGrpSpPr>
+        <p:grpSpPr>
+          <a:xfrm>
+            <a:off x="3273153" y="2413266"/>
+            <a:ext cx="1800000" cy="936000"/>
+            <a:chOff x="2101198" y="4355074"/>
+            <a:chExt cx="1800000" cy="936000"/>
+          </a:xfrm>
+        </p:grpSpPr>
+        <p:cxnSp>
+          <p:nvCxnSpPr>
+            <p:cNvPr id="55" name="Straight Connector 54">
+              <a:extLst>
+                <a:ext uri="{FF2B5EF4-FFF2-40B4-BE49-F238E27FC236}">
+                  <a16:creationId xmlns:a16="http://schemas.microsoft.com/office/drawing/2014/main" id="{D17FAEBE-EE27-ADE1-F6BB-B39E06EF7EC4}"/>
+                </a:ext>
+              </a:extLst>
+            </p:cNvPr>
+            <p:cNvCxnSpPr>
+              <a:cxnSpLocks/>
+            </p:cNvCxnSpPr>
+            <p:nvPr/>
+          </p:nvCxnSpPr>
+          <p:spPr>
+            <a:xfrm>
+              <a:off x="3047378" y="4355074"/>
+              <a:ext cx="0" cy="936000"/>
+            </a:xfrm>
+            <a:prstGeom prst="line">
+              <a:avLst/>
+            </a:prstGeom>
+            <a:ln w="76200">
+              <a:solidFill>
+                <a:schemeClr val="bg2">
+                  <a:lumMod val="50000"/>
+                </a:schemeClr>
+              </a:solidFill>
+            </a:ln>
+          </p:spPr>
+          <p:style>
+            <a:lnRef idx="1">
+              <a:schemeClr val="accent1"/>
+            </a:lnRef>
+            <a:fillRef idx="0">
+              <a:schemeClr val="accent1"/>
+            </a:fillRef>
+            <a:effectRef idx="0">
+              <a:schemeClr val="accent1"/>
+            </a:effectRef>
+            <a:fontRef idx="minor">
+              <a:schemeClr val="tx1"/>
+            </a:fontRef>
+          </p:style>
+        </p:cxnSp>
+        <p:cxnSp>
+          <p:nvCxnSpPr>
+            <p:cNvPr id="56" name="Straight Connector 55">
+              <a:extLst>
+                <a:ext uri="{FF2B5EF4-FFF2-40B4-BE49-F238E27FC236}">
+                  <a16:creationId xmlns:a16="http://schemas.microsoft.com/office/drawing/2014/main" id="{766CF59A-DF34-B4A8-D1AB-BC1FFA93C731}"/>
+                </a:ext>
+              </a:extLst>
+            </p:cNvPr>
+            <p:cNvCxnSpPr>
+              <a:cxnSpLocks/>
+            </p:cNvCxnSpPr>
+            <p:nvPr/>
+          </p:nvCxnSpPr>
+          <p:spPr>
+            <a:xfrm rot="3600000">
+              <a:off x="3001198" y="3464310"/>
+              <a:ext cx="0" cy="1800000"/>
+            </a:xfrm>
+            <a:prstGeom prst="line">
+              <a:avLst/>
+            </a:prstGeom>
+            <a:ln w="76200">
+              <a:solidFill>
+                <a:srgbClr val="4472C4"/>
+              </a:solidFill>
+            </a:ln>
+          </p:spPr>
+          <p:style>
+            <a:lnRef idx="1">
+              <a:schemeClr val="accent1"/>
+            </a:lnRef>
+            <a:fillRef idx="0">
+              <a:schemeClr val="accent1"/>
+            </a:fillRef>
+            <a:effectRef idx="0">
+              <a:schemeClr val="accent1"/>
+            </a:effectRef>
+            <a:fontRef idx="minor">
+              <a:schemeClr val="tx1"/>
+            </a:fontRef>
+          </p:style>
+        </p:cxnSp>
+      </p:grpSp>
+      <p:grpSp>
+        <p:nvGrpSpPr>
+          <p:cNvPr id="13" name="Group 12">
+            <a:extLst>
+              <a:ext uri="{FF2B5EF4-FFF2-40B4-BE49-F238E27FC236}">
+                <a16:creationId xmlns:a16="http://schemas.microsoft.com/office/drawing/2014/main" id="{7BBB7807-58E9-AC4A-33CB-D8862D619177}"/>
+              </a:ext>
+            </a:extLst>
+          </p:cNvPr>
+          <p:cNvGrpSpPr/>
+          <p:nvPr/>
+        </p:nvGrpSpPr>
+        <p:grpSpPr>
+          <a:xfrm>
+            <a:off x="2925346" y="276667"/>
+            <a:ext cx="1507766" cy="2646575"/>
+            <a:chOff x="2771046" y="-62645"/>
+            <a:chExt cx="1507766" cy="2646575"/>
+          </a:xfrm>
+        </p:grpSpPr>
+        <p:cxnSp>
+          <p:nvCxnSpPr>
+            <p:cNvPr id="57" name="Straight Arrow Connector 56">
+              <a:extLst>
+                <a:ext uri="{FF2B5EF4-FFF2-40B4-BE49-F238E27FC236}">
+                  <a16:creationId xmlns:a16="http://schemas.microsoft.com/office/drawing/2014/main" id="{2EACB0B1-1478-E1FA-22C6-0A8358A5726D}"/>
+                </a:ext>
+              </a:extLst>
+            </p:cNvPr>
+            <p:cNvCxnSpPr>
+              <a:cxnSpLocks/>
+            </p:cNvCxnSpPr>
+            <p:nvPr/>
+          </p:nvCxnSpPr>
+          <p:spPr>
+            <a:xfrm rot="3600000">
+              <a:off x="1871046" y="1683930"/>
+              <a:ext cx="1800000" cy="0"/>
+            </a:xfrm>
+            <a:prstGeom prst="straightConnector1">
+              <a:avLst/>
+            </a:prstGeom>
+            <a:ln w="25400">
+              <a:solidFill>
+                <a:srgbClr val="EBD741"/>
+              </a:solidFill>
+              <a:headEnd type="none" w="sm" len="sm"/>
+              <a:tailEnd type="none" w="sm" len="sm"/>
+            </a:ln>
+          </p:spPr>
+          <p:style>
+            <a:lnRef idx="1">
+              <a:schemeClr val="accent1"/>
+            </a:lnRef>
+            <a:fillRef idx="0">
+              <a:schemeClr val="accent1"/>
+            </a:fillRef>
+            <a:effectRef idx="0">
+              <a:schemeClr val="accent1"/>
+            </a:effectRef>
+            <a:fontRef idx="minor">
+              <a:schemeClr val="tx1"/>
+            </a:fontRef>
+          </p:style>
+        </p:cxnSp>
+        <p:cxnSp>
+          <p:nvCxnSpPr>
+            <p:cNvPr id="59" name="Straight Arrow Connector 58">
+              <a:extLst>
+                <a:ext uri="{FF2B5EF4-FFF2-40B4-BE49-F238E27FC236}">
+                  <a16:creationId xmlns:a16="http://schemas.microsoft.com/office/drawing/2014/main" id="{D61510C0-00D1-103B-F698-1F69976BAAD2}"/>
+                </a:ext>
+              </a:extLst>
+            </p:cNvPr>
+            <p:cNvCxnSpPr>
+              <a:cxnSpLocks/>
+            </p:cNvCxnSpPr>
+            <p:nvPr/>
+          </p:nvCxnSpPr>
+          <p:spPr>
+            <a:xfrm rot="3600000">
+              <a:off x="1950305" y="1640339"/>
+              <a:ext cx="1800000" cy="0"/>
+            </a:xfrm>
+            <a:prstGeom prst="straightConnector1">
+              <a:avLst/>
+            </a:prstGeom>
+            <a:ln w="25400">
+              <a:solidFill>
+                <a:srgbClr val="EBD741"/>
+              </a:solidFill>
+              <a:headEnd type="none" w="sm" len="sm"/>
+              <a:tailEnd type="none" w="sm" len="sm"/>
+            </a:ln>
+          </p:spPr>
+          <p:style>
+            <a:lnRef idx="1">
+              <a:schemeClr val="accent1"/>
+            </a:lnRef>
+            <a:fillRef idx="0">
+              <a:schemeClr val="accent1"/>
+            </a:fillRef>
+            <a:effectRef idx="0">
+              <a:schemeClr val="accent1"/>
+            </a:effectRef>
+            <a:fontRef idx="minor">
+              <a:schemeClr val="tx1"/>
+            </a:fontRef>
+          </p:style>
+        </p:cxnSp>
+        <p:cxnSp>
+          <p:nvCxnSpPr>
+            <p:cNvPr id="60" name="Straight Arrow Connector 59">
+              <a:extLst>
+                <a:ext uri="{FF2B5EF4-FFF2-40B4-BE49-F238E27FC236}">
+                  <a16:creationId xmlns:a16="http://schemas.microsoft.com/office/drawing/2014/main" id="{BBF2A5F4-AEC6-2E68-681E-398E0E20B651}"/>
+                </a:ext>
+              </a:extLst>
+            </p:cNvPr>
+            <p:cNvCxnSpPr>
+              <a:cxnSpLocks/>
+            </p:cNvCxnSpPr>
+            <p:nvPr/>
+          </p:nvCxnSpPr>
+          <p:spPr>
+            <a:xfrm rot="3600000">
+              <a:off x="2029564" y="1596748"/>
+              <a:ext cx="1800000" cy="0"/>
+            </a:xfrm>
+            <a:prstGeom prst="straightConnector1">
+              <a:avLst/>
+            </a:prstGeom>
+            <a:ln w="25400">
+              <a:solidFill>
+                <a:srgbClr val="EBD741"/>
+              </a:solidFill>
+              <a:headEnd type="none" w="sm" len="sm"/>
+              <a:tailEnd type="none" w="sm" len="sm"/>
+            </a:ln>
+          </p:spPr>
+          <p:style>
+            <a:lnRef idx="1">
+              <a:schemeClr val="accent1"/>
+            </a:lnRef>
+            <a:fillRef idx="0">
+              <a:schemeClr val="accent1"/>
+            </a:fillRef>
+            <a:effectRef idx="0">
+              <a:schemeClr val="accent1"/>
+            </a:effectRef>
+            <a:fontRef idx="minor">
+              <a:schemeClr val="tx1"/>
+            </a:fontRef>
+          </p:style>
+        </p:cxnSp>
+        <p:cxnSp>
+          <p:nvCxnSpPr>
+            <p:cNvPr id="61" name="Straight Arrow Connector 60">
+              <a:extLst>
+                <a:ext uri="{FF2B5EF4-FFF2-40B4-BE49-F238E27FC236}">
+                  <a16:creationId xmlns:a16="http://schemas.microsoft.com/office/drawing/2014/main" id="{A0E55CA2-47FB-B940-7CE4-6A08382B4170}"/>
+                </a:ext>
+              </a:extLst>
+            </p:cNvPr>
+            <p:cNvCxnSpPr>
+              <a:cxnSpLocks/>
+            </p:cNvCxnSpPr>
+            <p:nvPr/>
+          </p:nvCxnSpPr>
+          <p:spPr>
+            <a:xfrm rot="3600000">
+              <a:off x="2108822" y="1553157"/>
+              <a:ext cx="1800000" cy="0"/>
+            </a:xfrm>
+            <a:prstGeom prst="straightConnector1">
+              <a:avLst/>
+            </a:prstGeom>
+            <a:ln w="25400">
+              <a:solidFill>
+                <a:srgbClr val="EBD741"/>
+              </a:solidFill>
+              <a:headEnd type="none" w="sm" len="sm"/>
+              <a:tailEnd type="none" w="sm" len="sm"/>
+            </a:ln>
+          </p:spPr>
+          <p:style>
+            <a:lnRef idx="1">
+              <a:schemeClr val="accent1"/>
+            </a:lnRef>
+            <a:fillRef idx="0">
+              <a:schemeClr val="accent1"/>
+            </a:fillRef>
+            <a:effectRef idx="0">
+              <a:schemeClr val="accent1"/>
+            </a:effectRef>
+            <a:fontRef idx="minor">
+              <a:schemeClr val="tx1"/>
+            </a:fontRef>
+          </p:style>
+        </p:cxnSp>
+        <p:cxnSp>
+          <p:nvCxnSpPr>
+            <p:cNvPr id="62" name="Straight Arrow Connector 61">
+              <a:extLst>
+                <a:ext uri="{FF2B5EF4-FFF2-40B4-BE49-F238E27FC236}">
+                  <a16:creationId xmlns:a16="http://schemas.microsoft.com/office/drawing/2014/main" id="{4DC41F43-1EFA-1A60-8933-4200E6C34D4B}"/>
+                </a:ext>
+              </a:extLst>
+            </p:cNvPr>
+            <p:cNvCxnSpPr>
+              <a:cxnSpLocks/>
+            </p:cNvCxnSpPr>
+            <p:nvPr/>
+          </p:nvCxnSpPr>
+          <p:spPr>
+            <a:xfrm rot="3600000">
+              <a:off x="2180464" y="1503819"/>
+              <a:ext cx="1800000" cy="0"/>
+            </a:xfrm>
+            <a:prstGeom prst="straightConnector1">
+              <a:avLst/>
+            </a:prstGeom>
+            <a:ln w="25400">
+              <a:solidFill>
+                <a:srgbClr val="EBD741"/>
+              </a:solidFill>
+              <a:headEnd type="none" w="sm" len="sm"/>
+              <a:tailEnd type="none" w="sm" len="sm"/>
+            </a:ln>
+          </p:spPr>
+          <p:style>
+            <a:lnRef idx="1">
+              <a:schemeClr val="accent1"/>
+            </a:lnRef>
+            <a:fillRef idx="0">
+              <a:schemeClr val="accent1"/>
+            </a:fillRef>
+            <a:effectRef idx="0">
+              <a:schemeClr val="accent1"/>
+            </a:effectRef>
+            <a:fontRef idx="minor">
+              <a:schemeClr val="tx1"/>
+            </a:fontRef>
+          </p:style>
+        </p:cxnSp>
+        <p:cxnSp>
+          <p:nvCxnSpPr>
+            <p:cNvPr id="63" name="Straight Arrow Connector 62">
+              <a:extLst>
+                <a:ext uri="{FF2B5EF4-FFF2-40B4-BE49-F238E27FC236}">
+                  <a16:creationId xmlns:a16="http://schemas.microsoft.com/office/drawing/2014/main" id="{698A938A-7A9A-B196-BDB5-C6A66594F70E}"/>
+                </a:ext>
+              </a:extLst>
+            </p:cNvPr>
+            <p:cNvCxnSpPr>
+              <a:cxnSpLocks/>
+            </p:cNvCxnSpPr>
+            <p:nvPr/>
+          </p:nvCxnSpPr>
+          <p:spPr>
+            <a:xfrm rot="3600000">
+              <a:off x="2259723" y="1460228"/>
+              <a:ext cx="1800000" cy="0"/>
+            </a:xfrm>
+            <a:prstGeom prst="straightConnector1">
+              <a:avLst/>
+            </a:prstGeom>
+            <a:ln w="25400">
+              <a:solidFill>
+                <a:srgbClr val="EBD741"/>
+              </a:solidFill>
+              <a:headEnd type="none" w="sm" len="sm"/>
+              <a:tailEnd type="none" w="sm" len="sm"/>
+            </a:ln>
+          </p:spPr>
+          <p:style>
+            <a:lnRef idx="1">
+              <a:schemeClr val="accent1"/>
+            </a:lnRef>
+            <a:fillRef idx="0">
+              <a:schemeClr val="accent1"/>
+            </a:fillRef>
+            <a:effectRef idx="0">
+              <a:schemeClr val="accent1"/>
+            </a:effectRef>
+            <a:fontRef idx="minor">
+              <a:schemeClr val="tx1"/>
+            </a:fontRef>
+          </p:style>
+        </p:cxnSp>
+        <p:cxnSp>
+          <p:nvCxnSpPr>
+            <p:cNvPr id="64" name="Straight Arrow Connector 63">
+              <a:extLst>
+                <a:ext uri="{FF2B5EF4-FFF2-40B4-BE49-F238E27FC236}">
+                  <a16:creationId xmlns:a16="http://schemas.microsoft.com/office/drawing/2014/main" id="{A353AEC8-5E2A-4E57-8872-2B83141739E2}"/>
+                </a:ext>
+              </a:extLst>
+            </p:cNvPr>
+            <p:cNvCxnSpPr>
+              <a:cxnSpLocks/>
+            </p:cNvCxnSpPr>
+            <p:nvPr/>
+          </p:nvCxnSpPr>
+          <p:spPr>
+            <a:xfrm rot="3600000">
+              <a:off x="2338982" y="1416637"/>
+              <a:ext cx="1800000" cy="0"/>
+            </a:xfrm>
+            <a:prstGeom prst="straightConnector1">
+              <a:avLst/>
+            </a:prstGeom>
+            <a:ln w="25400">
+              <a:solidFill>
+                <a:srgbClr val="EBD741"/>
+              </a:solidFill>
+              <a:headEnd type="none" w="sm" len="sm"/>
+              <a:tailEnd type="none" w="sm" len="sm"/>
+            </a:ln>
+          </p:spPr>
+          <p:style>
+            <a:lnRef idx="1">
+              <a:schemeClr val="accent1"/>
+            </a:lnRef>
+            <a:fillRef idx="0">
+              <a:schemeClr val="accent1"/>
+            </a:fillRef>
+            <a:effectRef idx="0">
+              <a:schemeClr val="accent1"/>
+            </a:effectRef>
+            <a:fontRef idx="minor">
+              <a:schemeClr val="tx1"/>
+            </a:fontRef>
+          </p:style>
+        </p:cxnSp>
+        <p:cxnSp>
+          <p:nvCxnSpPr>
+            <p:cNvPr id="65" name="Straight Arrow Connector 64">
+              <a:extLst>
+                <a:ext uri="{FF2B5EF4-FFF2-40B4-BE49-F238E27FC236}">
+                  <a16:creationId xmlns:a16="http://schemas.microsoft.com/office/drawing/2014/main" id="{A7F05B9E-C303-6061-BC8A-EFDAA1FC361F}"/>
+                </a:ext>
+              </a:extLst>
+            </p:cNvPr>
+            <p:cNvCxnSpPr>
+              <a:cxnSpLocks/>
+            </p:cNvCxnSpPr>
+            <p:nvPr/>
+          </p:nvCxnSpPr>
+          <p:spPr>
+            <a:xfrm rot="3600000">
+              <a:off x="2418240" y="1373046"/>
+              <a:ext cx="1800000" cy="0"/>
+            </a:xfrm>
+            <a:prstGeom prst="straightConnector1">
+              <a:avLst/>
+            </a:prstGeom>
+            <a:ln w="25400">
+              <a:solidFill>
+                <a:srgbClr val="EBD741"/>
+              </a:solidFill>
+              <a:headEnd type="none" w="sm" len="sm"/>
+              <a:tailEnd type="none" w="sm" len="sm"/>
+            </a:ln>
+          </p:spPr>
+          <p:style>
+            <a:lnRef idx="1">
+              <a:schemeClr val="accent1"/>
+            </a:lnRef>
+            <a:fillRef idx="0">
+              <a:schemeClr val="accent1"/>
+            </a:fillRef>
+            <a:effectRef idx="0">
+              <a:schemeClr val="accent1"/>
+            </a:effectRef>
+            <a:fontRef idx="minor">
+              <a:schemeClr val="tx1"/>
+            </a:fontRef>
+          </p:style>
+        </p:cxnSp>
+        <p:cxnSp>
+          <p:nvCxnSpPr>
+            <p:cNvPr id="66" name="Straight Arrow Connector 65">
+              <a:extLst>
+                <a:ext uri="{FF2B5EF4-FFF2-40B4-BE49-F238E27FC236}">
+                  <a16:creationId xmlns:a16="http://schemas.microsoft.com/office/drawing/2014/main" id="{602D35DF-2E4F-746C-E4C5-B2FDF8F0FE14}"/>
+                </a:ext>
+              </a:extLst>
+            </p:cNvPr>
+            <p:cNvCxnSpPr>
+              <a:cxnSpLocks/>
+            </p:cNvCxnSpPr>
+            <p:nvPr/>
+          </p:nvCxnSpPr>
+          <p:spPr>
+            <a:xfrm rot="3600000">
+              <a:off x="2512975" y="1328343"/>
+              <a:ext cx="1800000" cy="0"/>
+            </a:xfrm>
+            <a:prstGeom prst="straightConnector1">
+              <a:avLst/>
+            </a:prstGeom>
+            <a:ln w="25400">
+              <a:solidFill>
+                <a:srgbClr val="EBD741"/>
+              </a:solidFill>
+              <a:headEnd type="none" w="sm" len="sm"/>
+              <a:tailEnd type="none" w="sm" len="sm"/>
+            </a:ln>
+          </p:spPr>
+          <p:style>
+            <a:lnRef idx="1">
+              <a:schemeClr val="accent1"/>
+            </a:lnRef>
+            <a:fillRef idx="0">
+              <a:schemeClr val="accent1"/>
+            </a:fillRef>
+            <a:effectRef idx="0">
+              <a:schemeClr val="accent1"/>
+            </a:effectRef>
+            <a:fontRef idx="minor">
+              <a:schemeClr val="tx1"/>
+            </a:fontRef>
+          </p:style>
+        </p:cxnSp>
+        <p:cxnSp>
+          <p:nvCxnSpPr>
+            <p:cNvPr id="67" name="Straight Arrow Connector 66">
+              <a:extLst>
+                <a:ext uri="{FF2B5EF4-FFF2-40B4-BE49-F238E27FC236}">
+                  <a16:creationId xmlns:a16="http://schemas.microsoft.com/office/drawing/2014/main" id="{3AB6049A-8AFC-E529-0467-7FCA3B0746E6}"/>
+                </a:ext>
+              </a:extLst>
+            </p:cNvPr>
+            <p:cNvCxnSpPr>
+              <a:cxnSpLocks/>
+            </p:cNvCxnSpPr>
+            <p:nvPr/>
+          </p:nvCxnSpPr>
+          <p:spPr>
+            <a:xfrm rot="3600000">
+              <a:off x="2592234" y="1284752"/>
+              <a:ext cx="1800000" cy="0"/>
+            </a:xfrm>
+            <a:prstGeom prst="straightConnector1">
+              <a:avLst/>
+            </a:prstGeom>
+            <a:ln w="25400">
+              <a:solidFill>
+                <a:srgbClr val="EBD741"/>
+              </a:solidFill>
+              <a:headEnd type="none" w="sm" len="sm"/>
+              <a:tailEnd type="none" w="sm" len="sm"/>
+            </a:ln>
+          </p:spPr>
+          <p:style>
+            <a:lnRef idx="1">
+              <a:schemeClr val="accent1"/>
+            </a:lnRef>
+            <a:fillRef idx="0">
+              <a:schemeClr val="accent1"/>
+            </a:fillRef>
+            <a:effectRef idx="0">
+              <a:schemeClr val="accent1"/>
+            </a:effectRef>
+            <a:fontRef idx="minor">
+              <a:schemeClr val="tx1"/>
+            </a:fontRef>
+          </p:style>
+        </p:cxnSp>
+        <p:cxnSp>
+          <p:nvCxnSpPr>
+            <p:cNvPr id="68" name="Straight Arrow Connector 67">
+              <a:extLst>
+                <a:ext uri="{FF2B5EF4-FFF2-40B4-BE49-F238E27FC236}">
+                  <a16:creationId xmlns:a16="http://schemas.microsoft.com/office/drawing/2014/main" id="{84006FD0-43F9-CBA3-3ADB-286E4AE21E83}"/>
+                </a:ext>
+              </a:extLst>
+            </p:cNvPr>
+            <p:cNvCxnSpPr>
+              <a:cxnSpLocks/>
+            </p:cNvCxnSpPr>
+            <p:nvPr/>
+          </p:nvCxnSpPr>
+          <p:spPr>
+            <a:xfrm rot="3600000">
+              <a:off x="2671493" y="1241161"/>
+              <a:ext cx="1800000" cy="0"/>
+            </a:xfrm>
+            <a:prstGeom prst="straightConnector1">
+              <a:avLst/>
+            </a:prstGeom>
+            <a:ln w="25400">
+              <a:solidFill>
+                <a:srgbClr val="EBD741"/>
+              </a:solidFill>
+              <a:headEnd type="none" w="sm" len="sm"/>
+              <a:tailEnd type="none" w="sm" len="sm"/>
+            </a:ln>
+          </p:spPr>
+          <p:style>
+            <a:lnRef idx="1">
+              <a:schemeClr val="accent1"/>
+            </a:lnRef>
+            <a:fillRef idx="0">
+              <a:schemeClr val="accent1"/>
+            </a:fillRef>
+            <a:effectRef idx="0">
+              <a:schemeClr val="accent1"/>
+            </a:effectRef>
+            <a:fontRef idx="minor">
+              <a:schemeClr val="tx1"/>
+            </a:fontRef>
+          </p:style>
+        </p:cxnSp>
+        <p:cxnSp>
+          <p:nvCxnSpPr>
+            <p:cNvPr id="69" name="Straight Arrow Connector 68">
+              <a:extLst>
+                <a:ext uri="{FF2B5EF4-FFF2-40B4-BE49-F238E27FC236}">
+                  <a16:creationId xmlns:a16="http://schemas.microsoft.com/office/drawing/2014/main" id="{D6944AC1-F59B-812D-9D5E-3C07346A6F2E}"/>
+                </a:ext>
+              </a:extLst>
+            </p:cNvPr>
+            <p:cNvCxnSpPr>
+              <a:cxnSpLocks/>
+            </p:cNvCxnSpPr>
+            <p:nvPr/>
+          </p:nvCxnSpPr>
+          <p:spPr>
+            <a:xfrm rot="3600000">
+              <a:off x="2750751" y="1197570"/>
+              <a:ext cx="1800000" cy="0"/>
+            </a:xfrm>
+            <a:prstGeom prst="straightConnector1">
+              <a:avLst/>
+            </a:prstGeom>
+            <a:ln w="25400">
+              <a:solidFill>
+                <a:srgbClr val="EBD741"/>
+              </a:solidFill>
+              <a:headEnd type="none" w="sm" len="sm"/>
+              <a:tailEnd type="none" w="sm" len="sm"/>
+            </a:ln>
+          </p:spPr>
+          <p:style>
+            <a:lnRef idx="1">
+              <a:schemeClr val="accent1"/>
+            </a:lnRef>
+            <a:fillRef idx="0">
+              <a:schemeClr val="accent1"/>
+            </a:fillRef>
+            <a:effectRef idx="0">
+              <a:schemeClr val="accent1"/>
+            </a:effectRef>
+            <a:fontRef idx="minor">
+              <a:schemeClr val="tx1"/>
+            </a:fontRef>
+          </p:style>
+        </p:cxnSp>
+        <p:cxnSp>
+          <p:nvCxnSpPr>
+            <p:cNvPr id="70" name="Straight Arrow Connector 69">
+              <a:extLst>
+                <a:ext uri="{FF2B5EF4-FFF2-40B4-BE49-F238E27FC236}">
+                  <a16:creationId xmlns:a16="http://schemas.microsoft.com/office/drawing/2014/main" id="{280D8B27-D3EE-E54E-B3DC-31A59F75DA56}"/>
+                </a:ext>
+              </a:extLst>
+            </p:cNvPr>
+            <p:cNvCxnSpPr>
+              <a:cxnSpLocks/>
+            </p:cNvCxnSpPr>
+            <p:nvPr/>
+          </p:nvCxnSpPr>
+          <p:spPr>
+            <a:xfrm rot="3600000">
+              <a:off x="2822393" y="1148232"/>
+              <a:ext cx="1800000" cy="0"/>
+            </a:xfrm>
+            <a:prstGeom prst="straightConnector1">
+              <a:avLst/>
+            </a:prstGeom>
+            <a:ln w="25400">
+              <a:solidFill>
+                <a:srgbClr val="EBD741"/>
+              </a:solidFill>
+              <a:headEnd type="none" w="sm" len="sm"/>
+              <a:tailEnd type="none" w="sm" len="sm"/>
+            </a:ln>
+          </p:spPr>
+          <p:style>
+            <a:lnRef idx="1">
+              <a:schemeClr val="accent1"/>
+            </a:lnRef>
+            <a:fillRef idx="0">
+              <a:schemeClr val="accent1"/>
+            </a:fillRef>
+            <a:effectRef idx="0">
+              <a:schemeClr val="accent1"/>
+            </a:effectRef>
+            <a:fontRef idx="minor">
+              <a:schemeClr val="tx1"/>
+            </a:fontRef>
+          </p:style>
+        </p:cxnSp>
+        <p:cxnSp>
+          <p:nvCxnSpPr>
+            <p:cNvPr id="71" name="Straight Arrow Connector 70">
+              <a:extLst>
+                <a:ext uri="{FF2B5EF4-FFF2-40B4-BE49-F238E27FC236}">
+                  <a16:creationId xmlns:a16="http://schemas.microsoft.com/office/drawing/2014/main" id="{B8D80E01-DB06-BE75-9C0F-C3E5BBB2F03D}"/>
+                </a:ext>
+              </a:extLst>
+            </p:cNvPr>
+            <p:cNvCxnSpPr>
+              <a:cxnSpLocks/>
+            </p:cNvCxnSpPr>
+            <p:nvPr/>
+          </p:nvCxnSpPr>
+          <p:spPr>
+            <a:xfrm rot="3600000">
+              <a:off x="2901652" y="1104641"/>
+              <a:ext cx="1800000" cy="0"/>
+            </a:xfrm>
+            <a:prstGeom prst="straightConnector1">
+              <a:avLst/>
+            </a:prstGeom>
+            <a:ln w="25400">
+              <a:solidFill>
+                <a:srgbClr val="EBD741"/>
+              </a:solidFill>
+              <a:headEnd type="none" w="sm" len="sm"/>
+              <a:tailEnd type="none" w="sm" len="sm"/>
+            </a:ln>
+          </p:spPr>
+          <p:style>
+            <a:lnRef idx="1">
+              <a:schemeClr val="accent1"/>
+            </a:lnRef>
+            <a:fillRef idx="0">
+              <a:schemeClr val="accent1"/>
+            </a:fillRef>
+            <a:effectRef idx="0">
+              <a:schemeClr val="accent1"/>
+            </a:effectRef>
+            <a:fontRef idx="minor">
+              <a:schemeClr val="tx1"/>
+            </a:fontRef>
+          </p:style>
+        </p:cxnSp>
+        <p:cxnSp>
+          <p:nvCxnSpPr>
+            <p:cNvPr id="72" name="Straight Arrow Connector 71">
+              <a:extLst>
+                <a:ext uri="{FF2B5EF4-FFF2-40B4-BE49-F238E27FC236}">
+                  <a16:creationId xmlns:a16="http://schemas.microsoft.com/office/drawing/2014/main" id="{3D443917-E335-3D9B-115D-64057D8DFD34}"/>
+                </a:ext>
+              </a:extLst>
+            </p:cNvPr>
+            <p:cNvCxnSpPr>
+              <a:cxnSpLocks/>
+            </p:cNvCxnSpPr>
+            <p:nvPr/>
+          </p:nvCxnSpPr>
+          <p:spPr>
+            <a:xfrm rot="3600000">
+              <a:off x="2980911" y="1061050"/>
+              <a:ext cx="1800000" cy="0"/>
+            </a:xfrm>
+            <a:prstGeom prst="straightConnector1">
+              <a:avLst/>
+            </a:prstGeom>
+            <a:ln w="25400">
+              <a:solidFill>
+                <a:srgbClr val="EBD741"/>
+              </a:solidFill>
+              <a:headEnd type="none" w="sm" len="sm"/>
+              <a:tailEnd type="none" w="sm" len="sm"/>
+            </a:ln>
+          </p:spPr>
+          <p:style>
+            <a:lnRef idx="1">
+              <a:schemeClr val="accent1"/>
+            </a:lnRef>
+            <a:fillRef idx="0">
+              <a:schemeClr val="accent1"/>
+            </a:fillRef>
+            <a:effectRef idx="0">
+              <a:schemeClr val="accent1"/>
+            </a:effectRef>
+            <a:fontRef idx="minor">
+              <a:schemeClr val="tx1"/>
+            </a:fontRef>
+          </p:style>
+        </p:cxnSp>
+        <p:cxnSp>
+          <p:nvCxnSpPr>
+            <p:cNvPr id="73" name="Straight Arrow Connector 72">
+              <a:extLst>
+                <a:ext uri="{FF2B5EF4-FFF2-40B4-BE49-F238E27FC236}">
+                  <a16:creationId xmlns:a16="http://schemas.microsoft.com/office/drawing/2014/main" id="{7DBC509C-A5B4-E529-1C8D-2A24EE1097CF}"/>
+                </a:ext>
+              </a:extLst>
+            </p:cNvPr>
+            <p:cNvCxnSpPr>
+              <a:cxnSpLocks/>
+            </p:cNvCxnSpPr>
+            <p:nvPr/>
+          </p:nvCxnSpPr>
+          <p:spPr>
+            <a:xfrm rot="3600000">
+              <a:off x="3060169" y="1017459"/>
+              <a:ext cx="1800000" cy="0"/>
+            </a:xfrm>
+            <a:prstGeom prst="straightConnector1">
+              <a:avLst/>
+            </a:prstGeom>
+            <a:ln w="25400">
+              <a:solidFill>
+                <a:srgbClr val="EBD741"/>
+              </a:solidFill>
+              <a:headEnd type="none" w="sm" len="sm"/>
+              <a:tailEnd type="none" w="sm" len="sm"/>
+            </a:ln>
+          </p:spPr>
+          <p:style>
+            <a:lnRef idx="1">
+              <a:schemeClr val="accent1"/>
+            </a:lnRef>
+            <a:fillRef idx="0">
+              <a:schemeClr val="accent1"/>
+            </a:fillRef>
+            <a:effectRef idx="0">
+              <a:schemeClr val="accent1"/>
+            </a:effectRef>
+            <a:fontRef idx="minor">
+              <a:schemeClr val="tx1"/>
+            </a:fontRef>
+          </p:style>
+        </p:cxnSp>
+        <p:cxnSp>
+          <p:nvCxnSpPr>
+            <p:cNvPr id="74" name="Straight Arrow Connector 73">
+              <a:extLst>
+                <a:ext uri="{FF2B5EF4-FFF2-40B4-BE49-F238E27FC236}">
+                  <a16:creationId xmlns:a16="http://schemas.microsoft.com/office/drawing/2014/main" id="{E5D4CAC5-322C-73DD-C3D0-897BB750D25F}"/>
+                </a:ext>
+              </a:extLst>
+            </p:cNvPr>
+            <p:cNvCxnSpPr>
+              <a:cxnSpLocks/>
+            </p:cNvCxnSpPr>
+            <p:nvPr/>
+          </p:nvCxnSpPr>
+          <p:spPr>
+            <a:xfrm rot="3600000">
+              <a:off x="3141036" y="968128"/>
+              <a:ext cx="1800000" cy="0"/>
+            </a:xfrm>
+            <a:prstGeom prst="straightConnector1">
+              <a:avLst/>
+            </a:prstGeom>
+            <a:ln w="25400">
+              <a:solidFill>
+                <a:srgbClr val="EBD741"/>
+              </a:solidFill>
+              <a:headEnd type="none" w="sm" len="sm"/>
+              <a:tailEnd type="none" w="sm" len="sm"/>
+            </a:ln>
+          </p:spPr>
+          <p:style>
+            <a:lnRef idx="1">
+              <a:schemeClr val="accent1"/>
+            </a:lnRef>
+            <a:fillRef idx="0">
+              <a:schemeClr val="accent1"/>
+            </a:fillRef>
+            <a:effectRef idx="0">
+              <a:schemeClr val="accent1"/>
+            </a:effectRef>
+            <a:fontRef idx="minor">
+              <a:schemeClr val="tx1"/>
+            </a:fontRef>
+          </p:style>
+        </p:cxnSp>
+        <p:cxnSp>
+          <p:nvCxnSpPr>
+            <p:cNvPr id="75" name="Straight Arrow Connector 74">
+              <a:extLst>
+                <a:ext uri="{FF2B5EF4-FFF2-40B4-BE49-F238E27FC236}">
+                  <a16:creationId xmlns:a16="http://schemas.microsoft.com/office/drawing/2014/main" id="{DC859130-CD52-2716-5260-56CA4427EE2B}"/>
+                </a:ext>
+              </a:extLst>
+            </p:cNvPr>
+            <p:cNvCxnSpPr>
+              <a:cxnSpLocks/>
+            </p:cNvCxnSpPr>
+            <p:nvPr/>
+          </p:nvCxnSpPr>
+          <p:spPr>
+            <a:xfrm rot="3600000">
+              <a:off x="3220295" y="924537"/>
+              <a:ext cx="1800000" cy="0"/>
+            </a:xfrm>
+            <a:prstGeom prst="straightConnector1">
+              <a:avLst/>
+            </a:prstGeom>
+            <a:ln w="25400">
+              <a:solidFill>
+                <a:srgbClr val="EBD741"/>
+              </a:solidFill>
+              <a:headEnd type="none" w="sm" len="sm"/>
+              <a:tailEnd type="none" w="sm" len="sm"/>
+            </a:ln>
+          </p:spPr>
+          <p:style>
+            <a:lnRef idx="1">
+              <a:schemeClr val="accent1"/>
+            </a:lnRef>
+            <a:fillRef idx="0">
+              <a:schemeClr val="accent1"/>
+            </a:fillRef>
+            <a:effectRef idx="0">
+              <a:schemeClr val="accent1"/>
+            </a:effectRef>
+            <a:fontRef idx="minor">
+              <a:schemeClr val="tx1"/>
+            </a:fontRef>
+          </p:style>
+        </p:cxnSp>
+        <p:cxnSp>
+          <p:nvCxnSpPr>
+            <p:cNvPr id="76" name="Straight Arrow Connector 75">
+              <a:extLst>
+                <a:ext uri="{FF2B5EF4-FFF2-40B4-BE49-F238E27FC236}">
+                  <a16:creationId xmlns:a16="http://schemas.microsoft.com/office/drawing/2014/main" id="{44012B2D-2535-8183-DA21-F461024521F7}"/>
+                </a:ext>
+              </a:extLst>
+            </p:cNvPr>
+            <p:cNvCxnSpPr>
+              <a:cxnSpLocks/>
+            </p:cNvCxnSpPr>
+            <p:nvPr/>
+          </p:nvCxnSpPr>
+          <p:spPr>
+            <a:xfrm rot="3600000">
+              <a:off x="3299554" y="880946"/>
+              <a:ext cx="1800000" cy="0"/>
+            </a:xfrm>
+            <a:prstGeom prst="straightConnector1">
+              <a:avLst/>
+            </a:prstGeom>
+            <a:ln w="25400">
+              <a:solidFill>
+                <a:srgbClr val="EBD741"/>
+              </a:solidFill>
+              <a:headEnd type="none" w="sm" len="sm"/>
+              <a:tailEnd type="none" w="sm" len="sm"/>
+            </a:ln>
+          </p:spPr>
+          <p:style>
+            <a:lnRef idx="1">
+              <a:schemeClr val="accent1"/>
+            </a:lnRef>
+            <a:fillRef idx="0">
+              <a:schemeClr val="accent1"/>
+            </a:fillRef>
+            <a:effectRef idx="0">
+              <a:schemeClr val="accent1"/>
+            </a:effectRef>
+            <a:fontRef idx="minor">
+              <a:schemeClr val="tx1"/>
+            </a:fontRef>
+          </p:style>
+        </p:cxnSp>
+        <p:cxnSp>
+          <p:nvCxnSpPr>
+            <p:cNvPr id="77" name="Straight Arrow Connector 76">
+              <a:extLst>
+                <a:ext uri="{FF2B5EF4-FFF2-40B4-BE49-F238E27FC236}">
+                  <a16:creationId xmlns:a16="http://schemas.microsoft.com/office/drawing/2014/main" id="{2AA0588B-1D61-5C20-CDEB-9ECB9EAC232A}"/>
+                </a:ext>
+              </a:extLst>
+            </p:cNvPr>
+            <p:cNvCxnSpPr>
+              <a:cxnSpLocks/>
+            </p:cNvCxnSpPr>
+            <p:nvPr/>
+          </p:nvCxnSpPr>
+          <p:spPr>
+            <a:xfrm rot="3600000">
+              <a:off x="3378812" y="837355"/>
+              <a:ext cx="1800000" cy="0"/>
+            </a:xfrm>
+            <a:prstGeom prst="straightConnector1">
+              <a:avLst/>
+            </a:prstGeom>
+            <a:ln w="25400">
+              <a:solidFill>
+                <a:srgbClr val="EBD741"/>
+              </a:solidFill>
+              <a:headEnd type="none" w="sm" len="sm"/>
+              <a:tailEnd type="none" w="sm" len="sm"/>
+            </a:ln>
+          </p:spPr>
+          <p:style>
+            <a:lnRef idx="1">
+              <a:schemeClr val="accent1"/>
+            </a:lnRef>
+            <a:fillRef idx="0">
+              <a:schemeClr val="accent1"/>
+            </a:fillRef>
+            <a:effectRef idx="0">
+              <a:schemeClr val="accent1"/>
+            </a:effectRef>
+            <a:fontRef idx="minor">
+              <a:schemeClr val="tx1"/>
+            </a:fontRef>
+          </p:style>
+        </p:cxnSp>
+      </p:grpSp>
+      <p:cxnSp>
+        <p:nvCxnSpPr>
+          <p:cNvPr id="102" name="Straight Arrow Connector 101">
+            <a:extLst>
+              <a:ext uri="{FF2B5EF4-FFF2-40B4-BE49-F238E27FC236}">
+                <a16:creationId xmlns:a16="http://schemas.microsoft.com/office/drawing/2014/main" id="{86BB1206-841D-F316-15DC-3008C246E736}"/>
+              </a:ext>
+            </a:extLst>
+          </p:cNvPr>
+          <p:cNvCxnSpPr>
+            <a:cxnSpLocks/>
+          </p:cNvCxnSpPr>
+          <p:nvPr/>
+        </p:nvCxnSpPr>
+        <p:spPr>
+          <a:xfrm flipH="1">
+            <a:off x="2664200" y="1674694"/>
+            <a:ext cx="0" cy="1788087"/>
+          </a:xfrm>
+          <a:prstGeom prst="straightConnector1">
+            <a:avLst/>
+          </a:prstGeom>
+          <a:ln w="25400">
+            <a:solidFill>
+              <a:schemeClr val="tx1"/>
+            </a:solidFill>
+            <a:prstDash val="dash"/>
+            <a:headEnd type="none" w="sm" len="sm"/>
+            <a:tailEnd type="none" w="sm" len="sm"/>
+          </a:ln>
+        </p:spPr>
+        <p:style>
+          <a:lnRef idx="1">
+            <a:schemeClr val="accent1"/>
+          </a:lnRef>
+          <a:fillRef idx="0">
+            <a:schemeClr val="accent1"/>
+          </a:fillRef>
+          <a:effectRef idx="0">
+            <a:schemeClr val="accent1"/>
+          </a:effectRef>
+          <a:fontRef idx="minor">
+            <a:schemeClr val="tx1"/>
+          </a:fontRef>
+        </p:style>
+      </p:cxnSp>
+      <p:cxnSp>
+        <p:nvCxnSpPr>
+          <p:cNvPr id="103" name="Straight Arrow Connector 102">
+            <a:extLst>
+              <a:ext uri="{FF2B5EF4-FFF2-40B4-BE49-F238E27FC236}">
+                <a16:creationId xmlns:a16="http://schemas.microsoft.com/office/drawing/2014/main" id="{20E0F5F0-BFF5-188E-08E6-F351E42961AB}"/>
+              </a:ext>
+            </a:extLst>
+          </p:cNvPr>
+          <p:cNvCxnSpPr>
+            <a:cxnSpLocks/>
+          </p:cNvCxnSpPr>
+          <p:nvPr/>
+        </p:nvCxnSpPr>
+        <p:spPr>
+          <a:xfrm>
+            <a:off x="2661163" y="2797488"/>
+            <a:ext cx="662096" cy="0"/>
+          </a:xfrm>
+          <a:prstGeom prst="straightConnector1">
+            <a:avLst/>
+          </a:prstGeom>
+          <a:ln w="25400">
+            <a:solidFill>
+              <a:schemeClr val="tx1"/>
+            </a:solidFill>
+            <a:prstDash val="dash"/>
+            <a:headEnd type="none" w="sm" len="sm"/>
+            <a:tailEnd type="none" w="sm" len="sm"/>
+          </a:ln>
+        </p:spPr>
+        <p:style>
+          <a:lnRef idx="1">
+            <a:schemeClr val="accent1"/>
+          </a:lnRef>
+          <a:fillRef idx="0">
+            <a:schemeClr val="accent1"/>
+          </a:fillRef>
+          <a:effectRef idx="0">
+            <a:schemeClr val="accent1"/>
+          </a:effectRef>
+          <a:fontRef idx="minor">
+            <a:schemeClr val="tx1"/>
+          </a:fontRef>
+        </p:style>
+      </p:cxnSp>
+      <p:cxnSp>
+        <p:nvCxnSpPr>
+          <p:cNvPr id="105" name="Straight Arrow Connector 104">
+            <a:extLst>
+              <a:ext uri="{FF2B5EF4-FFF2-40B4-BE49-F238E27FC236}">
+                <a16:creationId xmlns:a16="http://schemas.microsoft.com/office/drawing/2014/main" id="{E796CF97-3469-503E-5DA4-5ECD76EB67C7}"/>
+              </a:ext>
+            </a:extLst>
+          </p:cNvPr>
+          <p:cNvCxnSpPr>
+            <a:cxnSpLocks/>
+          </p:cNvCxnSpPr>
+          <p:nvPr/>
+        </p:nvCxnSpPr>
+        <p:spPr>
+          <a:xfrm>
+            <a:off x="2665060" y="3499238"/>
+            <a:ext cx="696331" cy="0"/>
+          </a:xfrm>
+          <a:prstGeom prst="straightConnector1">
+            <a:avLst/>
+          </a:prstGeom>
+          <a:ln w="25400">
+            <a:solidFill>
+              <a:schemeClr val="tx1"/>
+            </a:solidFill>
+            <a:headEnd type="arrow" w="sm" len="sm"/>
+            <a:tailEnd type="arrow" w="sm" len="sm"/>
+          </a:ln>
+        </p:spPr>
+        <p:style>
+          <a:lnRef idx="1">
+            <a:schemeClr val="accent1"/>
+          </a:lnRef>
+          <a:fillRef idx="0">
+            <a:schemeClr val="accent1"/>
+          </a:fillRef>
+          <a:effectRef idx="0">
+            <a:schemeClr val="accent1"/>
+          </a:effectRef>
+          <a:fontRef idx="minor">
+            <a:schemeClr val="tx1"/>
+          </a:fontRef>
+        </p:style>
+      </p:cxnSp>
+      <p:cxnSp>
+        <p:nvCxnSpPr>
+          <p:cNvPr id="326" name="Straight Arrow Connector 325">
+            <a:extLst>
+              <a:ext uri="{FF2B5EF4-FFF2-40B4-BE49-F238E27FC236}">
+                <a16:creationId xmlns:a16="http://schemas.microsoft.com/office/drawing/2014/main" id="{63059427-D71D-FEA9-0FD2-9C54F074EDE1}"/>
+              </a:ext>
+            </a:extLst>
+          </p:cNvPr>
+          <p:cNvCxnSpPr>
+            <a:cxnSpLocks/>
+          </p:cNvCxnSpPr>
+          <p:nvPr/>
+        </p:nvCxnSpPr>
+        <p:spPr>
+          <a:xfrm>
+            <a:off x="1105354" y="3967960"/>
+            <a:ext cx="2248062" cy="0"/>
+          </a:xfrm>
+          <a:prstGeom prst="straightConnector1">
+            <a:avLst/>
+          </a:prstGeom>
+          <a:ln w="25400">
+            <a:solidFill>
+              <a:schemeClr val="tx1"/>
+            </a:solidFill>
+            <a:headEnd type="arrow" w="sm" len="sm"/>
+            <a:tailEnd type="arrow" w="sm" len="sm"/>
+          </a:ln>
+        </p:spPr>
+        <p:style>
+          <a:lnRef idx="1">
+            <a:schemeClr val="accent1"/>
+          </a:lnRef>
+          <a:fillRef idx="0">
+            <a:schemeClr val="accent1"/>
+          </a:fillRef>
+          <a:effectRef idx="0">
+            <a:schemeClr val="accent1"/>
+          </a:effectRef>
+          <a:fontRef idx="minor">
+            <a:schemeClr val="tx1"/>
+          </a:fontRef>
+        </p:style>
+      </p:cxnSp>
+      <p:cxnSp>
+        <p:nvCxnSpPr>
+          <p:cNvPr id="328" name="Straight Arrow Connector 327">
+            <a:extLst>
+              <a:ext uri="{FF2B5EF4-FFF2-40B4-BE49-F238E27FC236}">
+                <a16:creationId xmlns:a16="http://schemas.microsoft.com/office/drawing/2014/main" id="{F7FE3070-8537-E147-D4A2-C44A8A5D9A2A}"/>
+              </a:ext>
+            </a:extLst>
+          </p:cNvPr>
+          <p:cNvCxnSpPr>
+            <a:cxnSpLocks/>
+          </p:cNvCxnSpPr>
+          <p:nvPr/>
+        </p:nvCxnSpPr>
+        <p:spPr>
+          <a:xfrm rot="-1800000">
+            <a:off x="214624" y="2762772"/>
+            <a:ext cx="972000" cy="0"/>
+          </a:xfrm>
+          <a:prstGeom prst="straightConnector1">
+            <a:avLst/>
+          </a:prstGeom>
+          <a:ln w="25400">
+            <a:solidFill>
+              <a:schemeClr val="tx1"/>
+            </a:solidFill>
+            <a:prstDash val="dash"/>
+            <a:headEnd type="none" w="sm" len="sm"/>
+            <a:tailEnd type="none" w="sm" len="sm"/>
+          </a:ln>
+        </p:spPr>
+        <p:style>
+          <a:lnRef idx="1">
+            <a:schemeClr val="accent1"/>
+          </a:lnRef>
+          <a:fillRef idx="0">
+            <a:schemeClr val="accent1"/>
+          </a:fillRef>
+          <a:effectRef idx="0">
+            <a:schemeClr val="accent1"/>
+          </a:effectRef>
+          <a:fontRef idx="minor">
+            <a:schemeClr val="tx1"/>
+          </a:fontRef>
+        </p:style>
+      </p:cxnSp>
+      <mc:AlternateContent xmlns:mc="http://schemas.openxmlformats.org/markup-compatibility/2006" xmlns:a14="http://schemas.microsoft.com/office/drawing/2010/main">
+        <mc:Choice Requires="a14">
+          <p:sp>
+            <p:nvSpPr>
+              <p:cNvPr id="334" name="TextBox 333">
+                <a:extLst>
+                  <a:ext uri="{FF2B5EF4-FFF2-40B4-BE49-F238E27FC236}">
+                    <a16:creationId xmlns:a16="http://schemas.microsoft.com/office/drawing/2014/main" id="{D401C194-525A-9DFC-CB1A-3258DB0D8BB8}"/>
+                  </a:ext>
+                </a:extLst>
+              </p:cNvPr>
+              <p:cNvSpPr txBox="1"/>
+              <p:nvPr/>
+            </p:nvSpPr>
+            <p:spPr>
+              <a:xfrm>
+                <a:off x="1687020" y="1661349"/>
+                <a:ext cx="192296" cy="276999"/>
+              </a:xfrm>
+              <a:prstGeom prst="rect">
+                <a:avLst/>
+              </a:prstGeom>
+              <a:noFill/>
+            </p:spPr>
+            <p:txBody>
+              <a:bodyPr wrap="square" lIns="0" tIns="0" rIns="0" bIns="0" rtlCol="0">
+                <a:spAutoFit/>
+              </a:bodyPr>
+              <a:lstStyle/>
+              <a:p>
+                <a:pPr/>
+                <a14:m>
+                  <m:oMathPara xmlns:m="http://schemas.openxmlformats.org/officeDocument/2006/math">
+                    <m:oMathParaPr>
+                      <m:jc m:val="centerGroup"/>
+                    </m:oMathParaPr>
+                    <m:oMath xmlns:m="http://schemas.openxmlformats.org/officeDocument/2006/math">
+                      <m:r>
+                        <a:rPr lang="en-GB" b="0" i="1" smtClean="0">
+                          <a:latin typeface="Cambria Math" panose="02040503050406030204" pitchFamily="18" charset="0"/>
+                        </a:rPr>
+                        <m:t>𝐿</m:t>
+                      </m:r>
+                    </m:oMath>
+                  </m:oMathPara>
+                </a14:m>
+                <a:endParaRPr lang="en-GB" dirty="0">
+                  <a:latin typeface="Arial" panose="020B0604020202020204" pitchFamily="34" charset="0"/>
+                  <a:cs typeface="Arial" panose="020B0604020202020204" pitchFamily="34" charset="0"/>
+                </a:endParaRPr>
+              </a:p>
+            </p:txBody>
+          </p:sp>
+        </mc:Choice>
+        <mc:Fallback xmlns="">
+          <p:sp>
+            <p:nvSpPr>
+              <p:cNvPr id="334" name="TextBox 333">
+                <a:extLst>
+                  <a:ext uri="{FF2B5EF4-FFF2-40B4-BE49-F238E27FC236}">
+                    <a16:creationId xmlns:a16="http://schemas.microsoft.com/office/drawing/2014/main" id="{D401C194-525A-9DFC-CB1A-3258DB0D8BB8}"/>
+                  </a:ext>
+                </a:extLst>
+              </p:cNvPr>
+              <p:cNvSpPr txBox="1">
+                <a:spLocks noRot="1" noChangeAspect="1" noMove="1" noResize="1" noEditPoints="1" noAdjustHandles="1" noChangeArrowheads="1" noChangeShapeType="1" noTextEdit="1"/>
+              </p:cNvSpPr>
+              <p:nvPr/>
+            </p:nvSpPr>
+            <p:spPr>
+              <a:xfrm>
+                <a:off x="1687020" y="1661349"/>
+                <a:ext cx="192296" cy="276999"/>
+              </a:xfrm>
+              <a:prstGeom prst="rect">
+                <a:avLst/>
+              </a:prstGeom>
+              <a:blipFill>
+                <a:blip r:embed="rId4"/>
+                <a:stretch>
+                  <a:fillRect l="-29032" r="-22581" b="-8889"/>
+                </a:stretch>
+              </a:blipFill>
+            </p:spPr>
+            <p:txBody>
+              <a:bodyPr/>
+              <a:lstStyle/>
+              <a:p>
+                <a:r>
+                  <a:rPr lang="en-GB">
+                    <a:noFill/>
+                  </a:rPr>
+                  <a:t> </a:t>
+                </a:r>
+              </a:p>
+            </p:txBody>
+          </p:sp>
+        </mc:Fallback>
+      </mc:AlternateContent>
+      <mc:AlternateContent xmlns:mc="http://schemas.openxmlformats.org/markup-compatibility/2006" xmlns:a14="http://schemas.microsoft.com/office/drawing/2010/main">
+        <mc:Choice Requires="a14">
+          <p:sp>
+            <p:nvSpPr>
+              <p:cNvPr id="335" name="TextBox 334">
+                <a:extLst>
+                  <a:ext uri="{FF2B5EF4-FFF2-40B4-BE49-F238E27FC236}">
+                    <a16:creationId xmlns:a16="http://schemas.microsoft.com/office/drawing/2014/main" id="{A288C93A-2BE9-4E76-35B6-2E9E4C9E068A}"/>
+                  </a:ext>
+                </a:extLst>
+              </p:cNvPr>
+              <p:cNvSpPr txBox="1"/>
+              <p:nvPr/>
+            </p:nvSpPr>
+            <p:spPr>
+              <a:xfrm>
+                <a:off x="1785925" y="3233354"/>
+                <a:ext cx="186781" cy="276999"/>
+              </a:xfrm>
+              <a:prstGeom prst="rect">
+                <a:avLst/>
+              </a:prstGeom>
+              <a:noFill/>
+            </p:spPr>
+            <p:txBody>
+              <a:bodyPr wrap="none" lIns="0" tIns="0" rIns="0" bIns="0" rtlCol="0">
+                <a:spAutoFit/>
+              </a:bodyPr>
+              <a:lstStyle/>
+              <a:p>
+                <a:pPr/>
+                <a14:m>
+                  <m:oMathPara xmlns:m="http://schemas.openxmlformats.org/officeDocument/2006/math">
+                    <m:oMathParaPr>
+                      <m:jc m:val="centerGroup"/>
+                    </m:oMathParaPr>
+                    <m:oMath xmlns:m="http://schemas.openxmlformats.org/officeDocument/2006/math">
+                      <m:r>
+                        <a:rPr lang="en-GB" b="0" i="1" smtClean="0">
+                          <a:latin typeface="Cambria Math" panose="02040503050406030204" pitchFamily="18" charset="0"/>
+                        </a:rPr>
+                        <m:t>𝑎</m:t>
+                      </m:r>
+                    </m:oMath>
+                  </m:oMathPara>
+                </a14:m>
+                <a:endParaRPr lang="en-GB" dirty="0"/>
+              </a:p>
+            </p:txBody>
+          </p:sp>
+        </mc:Choice>
+        <mc:Fallback xmlns="">
+          <p:sp>
+            <p:nvSpPr>
+              <p:cNvPr id="335" name="TextBox 334">
+                <a:extLst>
+                  <a:ext uri="{FF2B5EF4-FFF2-40B4-BE49-F238E27FC236}">
+                    <a16:creationId xmlns:a16="http://schemas.microsoft.com/office/drawing/2014/main" id="{A288C93A-2BE9-4E76-35B6-2E9E4C9E068A}"/>
+                  </a:ext>
+                </a:extLst>
+              </p:cNvPr>
+              <p:cNvSpPr txBox="1">
+                <a:spLocks noRot="1" noChangeAspect="1" noMove="1" noResize="1" noEditPoints="1" noAdjustHandles="1" noChangeArrowheads="1" noChangeShapeType="1" noTextEdit="1"/>
+              </p:cNvSpPr>
+              <p:nvPr/>
+            </p:nvSpPr>
+            <p:spPr>
+              <a:xfrm>
+                <a:off x="1785925" y="3233354"/>
+                <a:ext cx="186781" cy="276999"/>
+              </a:xfrm>
+              <a:prstGeom prst="rect">
+                <a:avLst/>
+              </a:prstGeom>
+              <a:blipFill>
+                <a:blip r:embed="rId5"/>
+                <a:stretch>
+                  <a:fillRect l="-19355" r="-12903"/>
+                </a:stretch>
+              </a:blipFill>
+            </p:spPr>
+            <p:txBody>
+              <a:bodyPr/>
+              <a:lstStyle/>
+              <a:p>
+                <a:r>
+                  <a:rPr lang="en-GB">
+                    <a:noFill/>
+                  </a:rPr>
+                  <a:t> </a:t>
+                </a:r>
+              </a:p>
+            </p:txBody>
+          </p:sp>
+        </mc:Fallback>
+      </mc:AlternateContent>
+      <mc:AlternateContent xmlns:mc="http://schemas.openxmlformats.org/markup-compatibility/2006" xmlns:a14="http://schemas.microsoft.com/office/drawing/2010/main">
+        <mc:Choice Requires="a14">
+          <p:sp>
+            <p:nvSpPr>
+              <p:cNvPr id="337" name="TextBox 336">
+                <a:extLst>
+                  <a:ext uri="{FF2B5EF4-FFF2-40B4-BE49-F238E27FC236}">
+                    <a16:creationId xmlns:a16="http://schemas.microsoft.com/office/drawing/2014/main" id="{6FA4695F-66C3-4D74-E30F-F03C0C645C06}"/>
+                  </a:ext>
+                </a:extLst>
+              </p:cNvPr>
+              <p:cNvSpPr txBox="1"/>
+              <p:nvPr/>
+            </p:nvSpPr>
+            <p:spPr>
+              <a:xfrm>
+                <a:off x="2896675" y="3244365"/>
+                <a:ext cx="186781" cy="276999"/>
+              </a:xfrm>
+              <a:prstGeom prst="rect">
+                <a:avLst/>
+              </a:prstGeom>
+              <a:noFill/>
+            </p:spPr>
+            <p:txBody>
+              <a:bodyPr wrap="none" lIns="0" tIns="0" rIns="0" bIns="0" rtlCol="0">
+                <a:spAutoFit/>
+              </a:bodyPr>
+              <a:lstStyle/>
+              <a:p>
+                <a:pPr/>
+                <a14:m>
+                  <m:oMathPara xmlns:m="http://schemas.openxmlformats.org/officeDocument/2006/math">
+                    <m:oMathParaPr>
+                      <m:jc m:val="centerGroup"/>
+                    </m:oMathParaPr>
+                    <m:oMath xmlns:m="http://schemas.openxmlformats.org/officeDocument/2006/math">
+                      <m:r>
+                        <a:rPr lang="en-GB" b="0" i="1" smtClean="0">
+                          <a:latin typeface="Cambria Math" panose="02040503050406030204" pitchFamily="18" charset="0"/>
+                        </a:rPr>
+                        <m:t>𝑏</m:t>
+                      </m:r>
+                    </m:oMath>
+                  </m:oMathPara>
+                </a14:m>
+                <a:endParaRPr lang="en-GB" dirty="0"/>
+              </a:p>
+            </p:txBody>
+          </p:sp>
+        </mc:Choice>
+        <mc:Fallback xmlns="">
+          <p:sp>
+            <p:nvSpPr>
+              <p:cNvPr id="337" name="TextBox 336">
+                <a:extLst>
+                  <a:ext uri="{FF2B5EF4-FFF2-40B4-BE49-F238E27FC236}">
+                    <a16:creationId xmlns:a16="http://schemas.microsoft.com/office/drawing/2014/main" id="{6FA4695F-66C3-4D74-E30F-F03C0C645C06}"/>
+                  </a:ext>
+                </a:extLst>
+              </p:cNvPr>
+              <p:cNvSpPr txBox="1">
+                <a:spLocks noRot="1" noChangeAspect="1" noMove="1" noResize="1" noEditPoints="1" noAdjustHandles="1" noChangeArrowheads="1" noChangeShapeType="1" noTextEdit="1"/>
+              </p:cNvSpPr>
+              <p:nvPr/>
+            </p:nvSpPr>
+            <p:spPr>
+              <a:xfrm>
+                <a:off x="2896675" y="3244365"/>
+                <a:ext cx="186781" cy="276999"/>
+              </a:xfrm>
+              <a:prstGeom prst="rect">
+                <a:avLst/>
+              </a:prstGeom>
+              <a:blipFill>
+                <a:blip r:embed="rId6"/>
+                <a:stretch>
+                  <a:fillRect l="-29032" r="-25806" b="-6522"/>
+                </a:stretch>
+              </a:blipFill>
+            </p:spPr>
+            <p:txBody>
+              <a:bodyPr/>
+              <a:lstStyle/>
+              <a:p>
+                <a:r>
+                  <a:rPr lang="en-GB">
+                    <a:noFill/>
+                  </a:rPr>
+                  <a:t> </a:t>
+                </a:r>
+              </a:p>
+            </p:txBody>
+          </p:sp>
+        </mc:Fallback>
+      </mc:AlternateContent>
+      <mc:AlternateContent xmlns:mc="http://schemas.openxmlformats.org/markup-compatibility/2006" xmlns:a14="http://schemas.microsoft.com/office/drawing/2010/main">
+        <mc:Choice Requires="a14">
+          <p:sp>
+            <p:nvSpPr>
+              <p:cNvPr id="338" name="TextBox 337">
+                <a:extLst>
+                  <a:ext uri="{FF2B5EF4-FFF2-40B4-BE49-F238E27FC236}">
+                    <a16:creationId xmlns:a16="http://schemas.microsoft.com/office/drawing/2014/main" id="{0EB82C10-D06B-2D71-0E9B-931EF87C5D54}"/>
+                  </a:ext>
+                </a:extLst>
+              </p:cNvPr>
+              <p:cNvSpPr txBox="1"/>
+              <p:nvPr/>
+            </p:nvSpPr>
+            <p:spPr>
+              <a:xfrm>
+                <a:off x="1983589" y="3675682"/>
+                <a:ext cx="610680" cy="301686"/>
+              </a:xfrm>
+              <a:prstGeom prst="rect">
+                <a:avLst/>
+              </a:prstGeom>
+              <a:noFill/>
+            </p:spPr>
+            <p:txBody>
+              <a:bodyPr wrap="none" lIns="0" tIns="0" rIns="0" bIns="0" rtlCol="0">
+                <a:spAutoFit/>
+              </a:bodyPr>
+              <a:lstStyle/>
+              <a:p>
+                <a:pPr/>
+                <a14:m>
+                  <m:oMathPara xmlns:m="http://schemas.openxmlformats.org/officeDocument/2006/math">
+                    <m:oMathParaPr>
+                      <m:jc m:val="centerGroup"/>
+                    </m:oMathParaPr>
+                    <m:oMath xmlns:m="http://schemas.openxmlformats.org/officeDocument/2006/math">
+                      <m:sSub>
+                        <m:sSubPr>
+                          <m:ctrlPr>
+                            <a:rPr lang="en-GB" b="0" i="1" smtClean="0">
+                              <a:latin typeface="Cambria Math" panose="02040503050406030204" pitchFamily="18" charset="0"/>
+                            </a:rPr>
+                          </m:ctrlPr>
+                        </m:sSubPr>
+                        <m:e>
+                          <m:r>
+                            <a:rPr lang="en-GB" b="0" i="1" smtClean="0">
+                              <a:latin typeface="Cambria Math" panose="02040503050406030204" pitchFamily="18" charset="0"/>
+                            </a:rPr>
+                            <m:t>𝑑</m:t>
+                          </m:r>
+                        </m:e>
+                        <m:sub>
+                          <m:r>
+                            <m:rPr>
+                              <m:sty m:val="p"/>
+                            </m:rPr>
+                            <a:rPr lang="en-GB" b="0" i="0" smtClean="0">
+                              <a:latin typeface="Cambria Math" panose="02040503050406030204" pitchFamily="18" charset="0"/>
+                            </a:rPr>
+                            <m:t>pitch</m:t>
+                          </m:r>
+                        </m:sub>
+                      </m:sSub>
+                    </m:oMath>
+                  </m:oMathPara>
+                </a14:m>
+                <a:endParaRPr lang="en-GB" dirty="0"/>
+              </a:p>
+            </p:txBody>
+          </p:sp>
+        </mc:Choice>
+        <mc:Fallback xmlns="">
+          <p:sp>
+            <p:nvSpPr>
+              <p:cNvPr id="338" name="TextBox 337">
+                <a:extLst>
+                  <a:ext uri="{FF2B5EF4-FFF2-40B4-BE49-F238E27FC236}">
+                    <a16:creationId xmlns:a16="http://schemas.microsoft.com/office/drawing/2014/main" id="{0EB82C10-D06B-2D71-0E9B-931EF87C5D54}"/>
+                  </a:ext>
+                </a:extLst>
+              </p:cNvPr>
+              <p:cNvSpPr txBox="1">
+                <a:spLocks noRot="1" noChangeAspect="1" noMove="1" noResize="1" noEditPoints="1" noAdjustHandles="1" noChangeArrowheads="1" noChangeShapeType="1" noTextEdit="1"/>
+              </p:cNvSpPr>
+              <p:nvPr/>
+            </p:nvSpPr>
+            <p:spPr>
+              <a:xfrm>
+                <a:off x="1983589" y="3675682"/>
+                <a:ext cx="610680" cy="301686"/>
+              </a:xfrm>
+              <a:prstGeom prst="rect">
+                <a:avLst/>
+              </a:prstGeom>
+              <a:blipFill>
+                <a:blip r:embed="rId7"/>
+                <a:stretch>
+                  <a:fillRect l="-8911" r="-7921" b="-28571"/>
+                </a:stretch>
+              </a:blipFill>
+            </p:spPr>
+            <p:txBody>
+              <a:bodyPr/>
+              <a:lstStyle/>
+              <a:p>
+                <a:r>
+                  <a:rPr lang="en-GB">
+                    <a:noFill/>
+                  </a:rPr>
+                  <a:t> </a:t>
+                </a:r>
+              </a:p>
+            </p:txBody>
+          </p:sp>
+        </mc:Fallback>
+      </mc:AlternateContent>
+      <mc:AlternateContent xmlns:mc="http://schemas.openxmlformats.org/markup-compatibility/2006" xmlns:a14="http://schemas.microsoft.com/office/drawing/2010/main">
+        <mc:Choice Requires="a14">
+          <p:sp>
+            <p:nvSpPr>
+              <p:cNvPr id="339" name="TextBox 338">
+                <a:extLst>
+                  <a:ext uri="{FF2B5EF4-FFF2-40B4-BE49-F238E27FC236}">
+                    <a16:creationId xmlns:a16="http://schemas.microsoft.com/office/drawing/2014/main" id="{1BAD85CB-84DD-A84F-DF3A-05A529F18FD5}"/>
+                  </a:ext>
+                </a:extLst>
+              </p:cNvPr>
+              <p:cNvSpPr txBox="1"/>
+              <p:nvPr/>
+            </p:nvSpPr>
+            <p:spPr>
+              <a:xfrm>
+                <a:off x="2459631" y="1982468"/>
+                <a:ext cx="192296" cy="276999"/>
+              </a:xfrm>
+              <a:prstGeom prst="rect">
+                <a:avLst/>
+              </a:prstGeom>
+              <a:noFill/>
+            </p:spPr>
+            <p:txBody>
+              <a:bodyPr wrap="square" lIns="0" tIns="0" rIns="0" bIns="0" rtlCol="0">
+                <a:spAutoFit/>
+              </a:bodyPr>
+              <a:lstStyle/>
+              <a:p>
+                <a:pPr/>
+                <a14:m>
+                  <m:oMathPara xmlns:m="http://schemas.openxmlformats.org/officeDocument/2006/math">
+                    <m:oMathParaPr>
+                      <m:jc m:val="centerGroup"/>
+                    </m:oMathParaPr>
+                    <m:oMath xmlns:m="http://schemas.openxmlformats.org/officeDocument/2006/math">
+                      <m:r>
+                        <a:rPr lang="en-GB" b="0" i="1" smtClean="0">
+                          <a:latin typeface="Cambria Math" panose="02040503050406030204" pitchFamily="18" charset="0"/>
+                        </a:rPr>
+                        <m:t>h</m:t>
+                      </m:r>
+                    </m:oMath>
+                  </m:oMathPara>
+                </a14:m>
+                <a:endParaRPr lang="en-GB" dirty="0">
+                  <a:latin typeface="Arial" panose="020B0604020202020204" pitchFamily="34" charset="0"/>
+                  <a:cs typeface="Arial" panose="020B0604020202020204" pitchFamily="34" charset="0"/>
+                </a:endParaRPr>
+              </a:p>
+            </p:txBody>
+          </p:sp>
+        </mc:Choice>
+        <mc:Fallback xmlns="">
+          <p:sp>
+            <p:nvSpPr>
+              <p:cNvPr id="339" name="TextBox 338">
+                <a:extLst>
+                  <a:ext uri="{FF2B5EF4-FFF2-40B4-BE49-F238E27FC236}">
+                    <a16:creationId xmlns:a16="http://schemas.microsoft.com/office/drawing/2014/main" id="{1BAD85CB-84DD-A84F-DF3A-05A529F18FD5}"/>
+                  </a:ext>
+                </a:extLst>
+              </p:cNvPr>
+              <p:cNvSpPr txBox="1">
+                <a:spLocks noRot="1" noChangeAspect="1" noMove="1" noResize="1" noEditPoints="1" noAdjustHandles="1" noChangeArrowheads="1" noChangeShapeType="1" noTextEdit="1"/>
+              </p:cNvSpPr>
+              <p:nvPr/>
+            </p:nvSpPr>
+            <p:spPr>
+              <a:xfrm>
+                <a:off x="2459631" y="1982468"/>
+                <a:ext cx="192296" cy="276999"/>
+              </a:xfrm>
+              <a:prstGeom prst="rect">
+                <a:avLst/>
+              </a:prstGeom>
+              <a:blipFill>
+                <a:blip r:embed="rId8"/>
+                <a:stretch>
+                  <a:fillRect l="-28125" r="-25000" b="-8696"/>
+                </a:stretch>
+              </a:blipFill>
+            </p:spPr>
+            <p:txBody>
+              <a:bodyPr/>
+              <a:lstStyle/>
+              <a:p>
+                <a:r>
+                  <a:rPr lang="en-GB">
+                    <a:noFill/>
+                  </a:rPr>
+                  <a:t> </a:t>
+                </a:r>
+              </a:p>
+            </p:txBody>
+          </p:sp>
+        </mc:Fallback>
+      </mc:AlternateContent>
+      <mc:AlternateContent xmlns:mc="http://schemas.openxmlformats.org/markup-compatibility/2006" xmlns:a14="http://schemas.microsoft.com/office/drawing/2010/main">
+        <mc:Choice Requires="a14">
+          <p:sp>
+            <p:nvSpPr>
+              <p:cNvPr id="343" name="TextBox 342">
+                <a:extLst>
+                  <a:ext uri="{FF2B5EF4-FFF2-40B4-BE49-F238E27FC236}">
+                    <a16:creationId xmlns:a16="http://schemas.microsoft.com/office/drawing/2014/main" id="{4E95F1C1-6F83-60A4-235F-C309EDDF956C}"/>
+                  </a:ext>
+                </a:extLst>
+              </p:cNvPr>
+              <p:cNvSpPr txBox="1"/>
+              <p:nvPr/>
+            </p:nvSpPr>
+            <p:spPr>
+              <a:xfrm>
+                <a:off x="658814" y="2738419"/>
+                <a:ext cx="192296" cy="246221"/>
+              </a:xfrm>
+              <a:prstGeom prst="rect">
+                <a:avLst/>
+              </a:prstGeom>
+              <a:noFill/>
+            </p:spPr>
+            <p:txBody>
+              <a:bodyPr wrap="square" lIns="0" tIns="0" rIns="0" bIns="0" rtlCol="0">
+                <a:spAutoFit/>
+              </a:bodyPr>
+              <a:lstStyle/>
+              <a:p>
+                <a:pPr/>
+                <a14:m>
+                  <m:oMathPara xmlns:m="http://schemas.openxmlformats.org/officeDocument/2006/math">
+                    <m:oMathParaPr>
+                      <m:jc m:val="centerGroup"/>
+                    </m:oMathParaPr>
+                    <m:oMath xmlns:m="http://schemas.openxmlformats.org/officeDocument/2006/math">
+                      <m:r>
+                        <m:rPr>
+                          <m:sty m:val="p"/>
+                        </m:rPr>
+                        <a:rPr lang="el-GR" sz="1600" b="0" i="1" smtClean="0">
+                          <a:latin typeface="Cambria Math" panose="02040503050406030204" pitchFamily="18" charset="0"/>
+                        </a:rPr>
+                        <m:t>β</m:t>
+                      </m:r>
+                    </m:oMath>
+                  </m:oMathPara>
+                </a14:m>
+                <a:endParaRPr lang="en-GB" sz="1600" dirty="0">
+                  <a:latin typeface="Arial" panose="020B0604020202020204" pitchFamily="34" charset="0"/>
+                  <a:cs typeface="Arial" panose="020B0604020202020204" pitchFamily="34" charset="0"/>
+                </a:endParaRPr>
+              </a:p>
+            </p:txBody>
+          </p:sp>
+        </mc:Choice>
+        <mc:Fallback xmlns="">
+          <p:sp>
+            <p:nvSpPr>
+              <p:cNvPr id="343" name="TextBox 342">
+                <a:extLst>
+                  <a:ext uri="{FF2B5EF4-FFF2-40B4-BE49-F238E27FC236}">
+                    <a16:creationId xmlns:a16="http://schemas.microsoft.com/office/drawing/2014/main" id="{4E95F1C1-6F83-60A4-235F-C309EDDF956C}"/>
+                  </a:ext>
+                </a:extLst>
+              </p:cNvPr>
+              <p:cNvSpPr txBox="1">
+                <a:spLocks noRot="1" noChangeAspect="1" noMove="1" noResize="1" noEditPoints="1" noAdjustHandles="1" noChangeArrowheads="1" noChangeShapeType="1" noTextEdit="1"/>
+              </p:cNvSpPr>
+              <p:nvPr/>
+            </p:nvSpPr>
+            <p:spPr>
+              <a:xfrm>
+                <a:off x="658814" y="2738419"/>
+                <a:ext cx="192296" cy="246221"/>
+              </a:xfrm>
+              <a:prstGeom prst="rect">
+                <a:avLst/>
+              </a:prstGeom>
+              <a:blipFill>
+                <a:blip r:embed="rId9"/>
+                <a:stretch>
+                  <a:fillRect l="-25000" r="-28125" b="-34146"/>
+                </a:stretch>
+              </a:blipFill>
+            </p:spPr>
+            <p:txBody>
+              <a:bodyPr/>
+              <a:lstStyle/>
+              <a:p>
+                <a:r>
+                  <a:rPr lang="en-GB">
+                    <a:noFill/>
+                  </a:rPr>
+                  <a:t> </a:t>
+                </a:r>
+              </a:p>
+            </p:txBody>
+          </p:sp>
+        </mc:Fallback>
+      </mc:AlternateContent>
+      <mc:AlternateContent xmlns:mc="http://schemas.openxmlformats.org/markup-compatibility/2006" xmlns:a14="http://schemas.microsoft.com/office/drawing/2010/main">
+        <mc:Choice Requires="a14">
+          <p:sp>
+            <p:nvSpPr>
+              <p:cNvPr id="344" name="TextBox 343">
+                <a:extLst>
+                  <a:ext uri="{FF2B5EF4-FFF2-40B4-BE49-F238E27FC236}">
+                    <a16:creationId xmlns:a16="http://schemas.microsoft.com/office/drawing/2014/main" id="{E0C45B58-1197-306D-961D-A7BB2A8EFF34}"/>
+                  </a:ext>
+                </a:extLst>
+              </p:cNvPr>
+              <p:cNvSpPr txBox="1"/>
+              <p:nvPr/>
+            </p:nvSpPr>
+            <p:spPr>
+              <a:xfrm>
+                <a:off x="2893242" y="2401669"/>
+                <a:ext cx="232949" cy="246221"/>
+              </a:xfrm>
+              <a:prstGeom prst="rect">
+                <a:avLst/>
+              </a:prstGeom>
+              <a:noFill/>
+            </p:spPr>
+            <p:txBody>
+              <a:bodyPr wrap="none" lIns="0" tIns="0" rIns="0" bIns="0" rtlCol="0">
+                <a:spAutoFit/>
+              </a:bodyPr>
+              <a:lstStyle/>
+              <a:p>
+                <a:pPr/>
+                <a14:m>
+                  <m:oMathPara xmlns:m="http://schemas.openxmlformats.org/officeDocument/2006/math">
+                    <m:oMathParaPr>
+                      <m:jc m:val="centerGroup"/>
+                    </m:oMathParaPr>
+                    <m:oMath xmlns:m="http://schemas.openxmlformats.org/officeDocument/2006/math">
+                      <m:sSub>
+                        <m:sSubPr>
+                          <m:ctrlPr>
+                            <a:rPr lang="en-GB" sz="1600" b="0" i="1" smtClean="0">
+                              <a:latin typeface="Cambria Math" panose="02040503050406030204" pitchFamily="18" charset="0"/>
+                            </a:rPr>
+                          </m:ctrlPr>
+                        </m:sSubPr>
+                        <m:e>
+                          <m:r>
+                            <m:rPr>
+                              <m:sty m:val="p"/>
+                            </m:rPr>
+                            <a:rPr lang="el-GR" sz="1600" b="0" i="1" smtClean="0">
+                              <a:latin typeface="Cambria Math" panose="02040503050406030204" pitchFamily="18" charset="0"/>
+                            </a:rPr>
+                            <m:t>γ</m:t>
+                          </m:r>
+                        </m:e>
+                        <m:sub>
+                          <m:r>
+                            <m:rPr>
+                              <m:sty m:val="p"/>
+                            </m:rPr>
+                            <a:rPr lang="en-GB" sz="1600" b="0" i="0" smtClean="0">
+                              <a:latin typeface="Cambria Math" panose="02040503050406030204" pitchFamily="18" charset="0"/>
+                            </a:rPr>
+                            <m:t>s</m:t>
+                          </m:r>
+                        </m:sub>
+                      </m:sSub>
+                    </m:oMath>
+                  </m:oMathPara>
+                </a14:m>
+                <a:endParaRPr lang="en-GB" sz="1600" dirty="0"/>
+              </a:p>
+            </p:txBody>
+          </p:sp>
+        </mc:Choice>
+        <mc:Fallback xmlns="">
+          <p:sp>
+            <p:nvSpPr>
+              <p:cNvPr id="344" name="TextBox 343">
+                <a:extLst>
+                  <a:ext uri="{FF2B5EF4-FFF2-40B4-BE49-F238E27FC236}">
+                    <a16:creationId xmlns:a16="http://schemas.microsoft.com/office/drawing/2014/main" id="{E0C45B58-1197-306D-961D-A7BB2A8EFF34}"/>
+                  </a:ext>
+                </a:extLst>
+              </p:cNvPr>
+              <p:cNvSpPr txBox="1">
+                <a:spLocks noRot="1" noChangeAspect="1" noMove="1" noResize="1" noEditPoints="1" noAdjustHandles="1" noChangeArrowheads="1" noChangeShapeType="1" noTextEdit="1"/>
+              </p:cNvSpPr>
+              <p:nvPr/>
+            </p:nvSpPr>
+            <p:spPr>
+              <a:xfrm>
+                <a:off x="2893242" y="2401669"/>
+                <a:ext cx="232949" cy="246221"/>
+              </a:xfrm>
+              <a:prstGeom prst="rect">
+                <a:avLst/>
+              </a:prstGeom>
+              <a:blipFill>
+                <a:blip r:embed="rId10"/>
+                <a:stretch>
+                  <a:fillRect l="-21053" r="-2632" b="-20000"/>
+                </a:stretch>
+              </a:blipFill>
+            </p:spPr>
+            <p:txBody>
+              <a:bodyPr/>
+              <a:lstStyle/>
+              <a:p>
+                <a:r>
+                  <a:rPr lang="en-GB">
+                    <a:noFill/>
+                  </a:rPr>
+                  <a:t> </a:t>
+                </a:r>
+              </a:p>
+            </p:txBody>
+          </p:sp>
+        </mc:Fallback>
+      </mc:AlternateContent>
+      <p:cxnSp>
+        <p:nvCxnSpPr>
+          <p:cNvPr id="347" name="Straight Arrow Connector 346">
+            <a:extLst>
+              <a:ext uri="{FF2B5EF4-FFF2-40B4-BE49-F238E27FC236}">
+                <a16:creationId xmlns:a16="http://schemas.microsoft.com/office/drawing/2014/main" id="{A71F2F48-9A0C-F112-F742-EADA36EB2BA7}"/>
+              </a:ext>
+            </a:extLst>
+          </p:cNvPr>
+          <p:cNvCxnSpPr>
+            <a:cxnSpLocks/>
+          </p:cNvCxnSpPr>
+          <p:nvPr/>
+        </p:nvCxnSpPr>
+        <p:spPr>
+          <a:xfrm rot="5400000">
+            <a:off x="2227972" y="2099408"/>
+            <a:ext cx="864000" cy="0"/>
+          </a:xfrm>
+          <a:prstGeom prst="straightConnector1">
+            <a:avLst/>
+          </a:prstGeom>
+          <a:ln w="25400">
+            <a:solidFill>
+              <a:schemeClr val="tx1"/>
+            </a:solidFill>
+            <a:headEnd type="arrow" w="sm" len="sm"/>
+            <a:tailEnd type="arrow" w="sm" len="sm"/>
+          </a:ln>
+        </p:spPr>
+        <p:style>
+          <a:lnRef idx="1">
+            <a:schemeClr val="accent1"/>
+          </a:lnRef>
+          <a:fillRef idx="0">
+            <a:schemeClr val="accent1"/>
+          </a:fillRef>
+          <a:effectRef idx="0">
+            <a:schemeClr val="accent1"/>
+          </a:effectRef>
+          <a:fontRef idx="minor">
+            <a:schemeClr val="tx1"/>
+          </a:fontRef>
+        </p:style>
+      </p:cxnSp>
+      <p:cxnSp>
+        <p:nvCxnSpPr>
+          <p:cNvPr id="5" name="Straight Arrow Connector 4">
+            <a:extLst>
+              <a:ext uri="{FF2B5EF4-FFF2-40B4-BE49-F238E27FC236}">
+                <a16:creationId xmlns:a16="http://schemas.microsoft.com/office/drawing/2014/main" id="{07D4038F-87EF-ECFF-6267-251EB9CB31A6}"/>
+              </a:ext>
+            </a:extLst>
+          </p:cNvPr>
+          <p:cNvCxnSpPr>
+            <a:cxnSpLocks/>
+          </p:cNvCxnSpPr>
+          <p:nvPr/>
+        </p:nvCxnSpPr>
+        <p:spPr>
+          <a:xfrm>
+            <a:off x="279735" y="3005063"/>
+            <a:ext cx="5206665" cy="20520"/>
+          </a:xfrm>
+          <a:prstGeom prst="straightConnector1">
+            <a:avLst/>
+          </a:prstGeom>
+          <a:ln w="25400">
+            <a:solidFill>
+              <a:schemeClr val="tx1"/>
+            </a:solidFill>
+            <a:prstDash val="dash"/>
+            <a:headEnd type="none" w="sm" len="sm"/>
+            <a:tailEnd type="none" w="sm" len="sm"/>
+          </a:ln>
+        </p:spPr>
+        <p:style>
+          <a:lnRef idx="1">
+            <a:schemeClr val="accent1"/>
+          </a:lnRef>
+          <a:fillRef idx="0">
+            <a:schemeClr val="accent1"/>
+          </a:fillRef>
+          <a:effectRef idx="0">
+            <a:schemeClr val="accent1"/>
+          </a:effectRef>
+          <a:fontRef idx="minor">
+            <a:schemeClr val="tx1"/>
+          </a:fontRef>
+        </p:style>
+      </p:cxnSp>
+      <p:cxnSp>
+        <p:nvCxnSpPr>
+          <p:cNvPr id="17" name="Straight Arrow Connector 16">
+            <a:extLst>
+              <a:ext uri="{FF2B5EF4-FFF2-40B4-BE49-F238E27FC236}">
+                <a16:creationId xmlns:a16="http://schemas.microsoft.com/office/drawing/2014/main" id="{CA17532D-88B5-066A-0708-8C7238052221}"/>
+              </a:ext>
+            </a:extLst>
+          </p:cNvPr>
+          <p:cNvCxnSpPr>
+            <a:cxnSpLocks/>
+          </p:cNvCxnSpPr>
+          <p:nvPr/>
+        </p:nvCxnSpPr>
+        <p:spPr>
+          <a:xfrm>
+            <a:off x="2659972" y="2530822"/>
+            <a:ext cx="0" cy="282139"/>
+          </a:xfrm>
+          <a:prstGeom prst="straightConnector1">
+            <a:avLst/>
+          </a:prstGeom>
+          <a:ln w="25400">
+            <a:solidFill>
+              <a:schemeClr val="tx1"/>
+            </a:solidFill>
+            <a:headEnd type="arrow" w="sm" len="sm"/>
+            <a:tailEnd type="arrow" w="sm" len="sm"/>
+          </a:ln>
+        </p:spPr>
+        <p:style>
+          <a:lnRef idx="1">
+            <a:schemeClr val="accent1"/>
+          </a:lnRef>
+          <a:fillRef idx="0">
+            <a:schemeClr val="accent1"/>
+          </a:fillRef>
+          <a:effectRef idx="0">
+            <a:schemeClr val="accent1"/>
+          </a:effectRef>
+          <a:fontRef idx="minor">
+            <a:schemeClr val="tx1"/>
+          </a:fontRef>
+        </p:style>
+      </p:cxnSp>
+      <p:cxnSp>
+        <p:nvCxnSpPr>
+          <p:cNvPr id="19" name="Straight Arrow Connector 18">
+            <a:extLst>
+              <a:ext uri="{FF2B5EF4-FFF2-40B4-BE49-F238E27FC236}">
+                <a16:creationId xmlns:a16="http://schemas.microsoft.com/office/drawing/2014/main" id="{9CC81601-E618-83F9-7E8C-0FDDB5B55106}"/>
+              </a:ext>
+            </a:extLst>
+          </p:cNvPr>
+          <p:cNvCxnSpPr>
+            <a:cxnSpLocks/>
+          </p:cNvCxnSpPr>
+          <p:nvPr/>
+        </p:nvCxnSpPr>
+        <p:spPr>
+          <a:xfrm>
+            <a:off x="4109750" y="3025656"/>
+            <a:ext cx="0" cy="282139"/>
+          </a:xfrm>
+          <a:prstGeom prst="straightConnector1">
+            <a:avLst/>
+          </a:prstGeom>
+          <a:ln w="25400">
+            <a:solidFill>
+              <a:schemeClr val="tx1"/>
+            </a:solidFill>
+            <a:headEnd type="arrow" w="sm" len="sm"/>
+            <a:tailEnd type="arrow" w="sm" len="sm"/>
+          </a:ln>
+        </p:spPr>
+        <p:style>
+          <a:lnRef idx="1">
+            <a:schemeClr val="accent1"/>
+          </a:lnRef>
+          <a:fillRef idx="0">
+            <a:schemeClr val="accent1"/>
+          </a:fillRef>
+          <a:effectRef idx="0">
+            <a:schemeClr val="accent1"/>
+          </a:effectRef>
+          <a:fontRef idx="minor">
+            <a:schemeClr val="tx1"/>
+          </a:fontRef>
+        </p:style>
+      </p:cxnSp>
+      <mc:AlternateContent xmlns:mc="http://schemas.openxmlformats.org/markup-compatibility/2006">
+        <mc:Choice xmlns:a14="http://schemas.microsoft.com/office/drawing/2010/main" Requires="a14">
+          <p:sp>
+            <p:nvSpPr>
+              <p:cNvPr id="20" name="TextBox 19">
+                <a:extLst>
+                  <a:ext uri="{FF2B5EF4-FFF2-40B4-BE49-F238E27FC236}">
+                    <a16:creationId xmlns:a16="http://schemas.microsoft.com/office/drawing/2014/main" id="{3329444F-D97D-8E94-8367-25ED367CAD82}"/>
+                  </a:ext>
+                </a:extLst>
+              </p:cNvPr>
+              <p:cNvSpPr txBox="1"/>
+              <p:nvPr/>
+            </p:nvSpPr>
+            <p:spPr>
+              <a:xfrm>
+                <a:off x="3888953" y="3013083"/>
+                <a:ext cx="166006" cy="276999"/>
+              </a:xfrm>
+              <a:prstGeom prst="rect">
+                <a:avLst/>
+              </a:prstGeom>
+              <a:noFill/>
+            </p:spPr>
+            <p:txBody>
+              <a:bodyPr wrap="none" lIns="0" tIns="0" rIns="0" bIns="0" rtlCol="0">
+                <a:spAutoFit/>
+              </a:bodyPr>
+              <a:lstStyle/>
+              <a:p>
+                <a:pPr/>
+                <a14:m>
+                  <m:oMathPara xmlns:m="http://schemas.openxmlformats.org/officeDocument/2006/math">
+                    <m:oMathParaPr>
+                      <m:jc m:val="centerGroup"/>
+                    </m:oMathParaPr>
+                    <m:oMath xmlns:m="http://schemas.openxmlformats.org/officeDocument/2006/math">
+                      <m:r>
+                        <a:rPr lang="en-GB" b="0" i="1" smtClean="0">
+                          <a:latin typeface="Cambria Math" panose="02040503050406030204" pitchFamily="18" charset="0"/>
+                        </a:rPr>
+                        <m:t>𝑐</m:t>
+                      </m:r>
+                    </m:oMath>
+                  </m:oMathPara>
+                </a14:m>
+                <a:endParaRPr lang="en-GB" dirty="0"/>
+              </a:p>
+            </p:txBody>
+          </p:sp>
+        </mc:Choice>
+        <mc:Fallback>
+          <p:sp>
+            <p:nvSpPr>
+              <p:cNvPr id="20" name="TextBox 19">
+                <a:extLst>
+                  <a:ext uri="{FF2B5EF4-FFF2-40B4-BE49-F238E27FC236}">
+                    <a16:creationId xmlns:a16="http://schemas.microsoft.com/office/drawing/2014/main" id="{3329444F-D97D-8E94-8367-25ED367CAD82}"/>
+                  </a:ext>
+                </a:extLst>
+              </p:cNvPr>
+              <p:cNvSpPr txBox="1">
+                <a:spLocks noRot="1" noChangeAspect="1" noMove="1" noResize="1" noEditPoints="1" noAdjustHandles="1" noChangeArrowheads="1" noChangeShapeType="1" noTextEdit="1"/>
+              </p:cNvSpPr>
+              <p:nvPr/>
+            </p:nvSpPr>
+            <p:spPr>
+              <a:xfrm>
+                <a:off x="3888953" y="3013083"/>
+                <a:ext cx="166006" cy="276999"/>
+              </a:xfrm>
+              <a:prstGeom prst="rect">
+                <a:avLst/>
+              </a:prstGeom>
+              <a:blipFill>
+                <a:blip r:embed="rId11"/>
+                <a:stretch>
+                  <a:fillRect l="-22222" r="-14815"/>
+                </a:stretch>
+              </a:blipFill>
+            </p:spPr>
+            <p:txBody>
+              <a:bodyPr/>
+              <a:lstStyle/>
+              <a:p>
+                <a:r>
+                  <a:rPr lang="en-GB">
+                    <a:noFill/>
+                  </a:rPr>
+                  <a:t> </a:t>
+                </a:r>
+              </a:p>
+            </p:txBody>
+          </p:sp>
+        </mc:Fallback>
+      </mc:AlternateContent>
+      <p:sp>
+        <p:nvSpPr>
+          <p:cNvPr id="23" name="Partial Circle 22">
+            <a:extLst>
+              <a:ext uri="{FF2B5EF4-FFF2-40B4-BE49-F238E27FC236}">
+                <a16:creationId xmlns:a16="http://schemas.microsoft.com/office/drawing/2014/main" id="{C0A938D8-E2F2-D2C4-E671-7DD6B9ACB242}"/>
+              </a:ext>
+            </a:extLst>
+          </p:cNvPr>
+          <p:cNvSpPr/>
+          <p:nvPr/>
+        </p:nvSpPr>
+        <p:spPr>
+          <a:xfrm rot="19406360">
+            <a:off x="-59569" y="2690821"/>
+            <a:ext cx="680110" cy="626174"/>
+          </a:xfrm>
+          <a:prstGeom prst="pie">
+            <a:avLst>
+              <a:gd name="adj1" fmla="val 2078796"/>
+              <a:gd name="adj2" fmla="val 2818985"/>
+            </a:avLst>
+          </a:prstGeom>
+          <a:solidFill>
+            <a:srgbClr val="C00000"/>
+          </a:solidFill>
+          <a:ln>
+            <a:noFill/>
+          </a:ln>
+        </p:spPr>
+        <p:style>
+          <a:lnRef idx="2">
+            <a:schemeClr val="accent1">
+              <a:shade val="50000"/>
+            </a:schemeClr>
+          </a:lnRef>
+          <a:fillRef idx="1">
+            <a:schemeClr val="accent1"/>
+          </a:fillRef>
+          <a:effectRef idx="0">
+            <a:schemeClr val="accent1"/>
+          </a:effectRef>
+          <a:fontRef idx="minor">
+            <a:schemeClr val="lt1"/>
+          </a:fontRef>
+        </p:style>
+        <p:txBody>
+          <a:bodyPr rtlCol="0" anchor="ctr"/>
+          <a:lstStyle/>
+          <a:p>
+            <a:pPr algn="ctr"/>
+            <a:endParaRPr lang="en-GB">
+              <a:solidFill>
+                <a:schemeClr val="tx1"/>
+              </a:solidFill>
+            </a:endParaRPr>
+          </a:p>
+        </p:txBody>
+      </p:sp>
+      <mc:AlternateContent xmlns:mc="http://schemas.openxmlformats.org/markup-compatibility/2006" xmlns:a14="http://schemas.microsoft.com/office/drawing/2010/main">
+        <mc:Choice Requires="a14">
+          <p:sp>
+            <p:nvSpPr>
+              <p:cNvPr id="24" name="TextBox 23">
+                <a:extLst>
+                  <a:ext uri="{FF2B5EF4-FFF2-40B4-BE49-F238E27FC236}">
+                    <a16:creationId xmlns:a16="http://schemas.microsoft.com/office/drawing/2014/main" id="{D93C60C0-FC00-C9CD-9F1C-A0E4E0A4BA9F}"/>
+                  </a:ext>
+                </a:extLst>
+              </p:cNvPr>
+              <p:cNvSpPr txBox="1"/>
+              <p:nvPr/>
+            </p:nvSpPr>
+            <p:spPr>
+              <a:xfrm>
+                <a:off x="505536" y="3089363"/>
+                <a:ext cx="192296" cy="246221"/>
+              </a:xfrm>
+              <a:prstGeom prst="rect">
+                <a:avLst/>
+              </a:prstGeom>
+              <a:noFill/>
+            </p:spPr>
+            <p:txBody>
+              <a:bodyPr wrap="square" lIns="0" tIns="0" rIns="0" bIns="0" rtlCol="0">
+                <a:spAutoFit/>
+              </a:bodyPr>
+              <a:lstStyle/>
+              <a:p>
+                <a:pPr/>
+                <a14:m>
+                  <m:oMathPara xmlns:m="http://schemas.openxmlformats.org/officeDocument/2006/math">
+                    <m:oMathParaPr>
+                      <m:jc m:val="centerGroup"/>
+                    </m:oMathParaPr>
+                    <m:oMath xmlns:m="http://schemas.openxmlformats.org/officeDocument/2006/math">
+                      <m:r>
+                        <m:rPr>
+                          <m:sty m:val="p"/>
+                        </m:rPr>
+                        <a:rPr lang="el-GR" sz="1600" b="0" i="1" smtClean="0">
+                          <a:solidFill>
+                            <a:srgbClr val="C00000"/>
+                          </a:solidFill>
+                          <a:latin typeface="Cambria Math" panose="02040503050406030204" pitchFamily="18" charset="0"/>
+                        </a:rPr>
+                        <m:t>θ</m:t>
+                      </m:r>
+                    </m:oMath>
+                  </m:oMathPara>
+                </a14:m>
+                <a:endParaRPr lang="en-GB" sz="1600" dirty="0">
+                  <a:solidFill>
+                    <a:srgbClr val="C00000"/>
+                  </a:solidFill>
+                  <a:latin typeface="Arial" panose="020B0604020202020204" pitchFamily="34" charset="0"/>
+                  <a:cs typeface="Arial" panose="020B0604020202020204" pitchFamily="34" charset="0"/>
+                </a:endParaRPr>
+              </a:p>
+            </p:txBody>
+          </p:sp>
+        </mc:Choice>
+        <mc:Fallback xmlns="">
+          <p:sp>
+            <p:nvSpPr>
+              <p:cNvPr id="24" name="TextBox 23">
+                <a:extLst>
+                  <a:ext uri="{FF2B5EF4-FFF2-40B4-BE49-F238E27FC236}">
+                    <a16:creationId xmlns:a16="http://schemas.microsoft.com/office/drawing/2014/main" id="{D93C60C0-FC00-C9CD-9F1C-A0E4E0A4BA9F}"/>
+                  </a:ext>
+                </a:extLst>
+              </p:cNvPr>
+              <p:cNvSpPr txBox="1">
+                <a:spLocks noRot="1" noChangeAspect="1" noMove="1" noResize="1" noEditPoints="1" noAdjustHandles="1" noChangeArrowheads="1" noChangeShapeType="1" noTextEdit="1"/>
+              </p:cNvSpPr>
+              <p:nvPr/>
+            </p:nvSpPr>
+            <p:spPr>
+              <a:xfrm>
+                <a:off x="505536" y="3089363"/>
+                <a:ext cx="192296" cy="246221"/>
+              </a:xfrm>
+              <a:prstGeom prst="rect">
+                <a:avLst/>
+              </a:prstGeom>
+              <a:blipFill>
+                <a:blip r:embed="rId12"/>
+                <a:stretch>
+                  <a:fillRect l="-16129" r="-19355" b="-10000"/>
+                </a:stretch>
+              </a:blipFill>
+            </p:spPr>
+            <p:txBody>
+              <a:bodyPr/>
+              <a:lstStyle/>
+              <a:p>
+                <a:r>
+                  <a:rPr lang="en-GB">
+                    <a:noFill/>
+                  </a:rPr>
+                  <a:t> </a:t>
+                </a:r>
+              </a:p>
+            </p:txBody>
+          </p:sp>
+        </mc:Fallback>
+      </mc:AlternateContent>
+      <mc:AlternateContent xmlns:mc="http://schemas.openxmlformats.org/markup-compatibility/2006">
+        <mc:Choice xmlns:a14="http://schemas.microsoft.com/office/drawing/2010/main" Requires="a14">
+          <p:sp>
+            <p:nvSpPr>
+              <p:cNvPr id="2" name="TextBox 1">
+                <a:extLst>
+                  <a:ext uri="{FF2B5EF4-FFF2-40B4-BE49-F238E27FC236}">
+                    <a16:creationId xmlns:a16="http://schemas.microsoft.com/office/drawing/2014/main" id="{56D89925-F3CA-F571-8C5E-4BF5E586EF39}"/>
+                  </a:ext>
+                </a:extLst>
+              </p:cNvPr>
+              <p:cNvSpPr txBox="1"/>
+              <p:nvPr/>
+            </p:nvSpPr>
+            <p:spPr>
+              <a:xfrm>
+                <a:off x="2446785" y="2493514"/>
+                <a:ext cx="166006" cy="276999"/>
+              </a:xfrm>
+              <a:prstGeom prst="rect">
+                <a:avLst/>
+              </a:prstGeom>
+              <a:noFill/>
+            </p:spPr>
+            <p:txBody>
+              <a:bodyPr wrap="none" lIns="0" tIns="0" rIns="0" bIns="0" rtlCol="0">
+                <a:spAutoFit/>
+              </a:bodyPr>
+              <a:lstStyle/>
+              <a:p>
+                <a:pPr/>
+                <a14:m>
+                  <m:oMathPara xmlns:m="http://schemas.openxmlformats.org/officeDocument/2006/math">
+                    <m:oMathParaPr>
+                      <m:jc m:val="centerGroup"/>
+                    </m:oMathParaPr>
+                    <m:oMath xmlns:m="http://schemas.openxmlformats.org/officeDocument/2006/math">
+                      <m:r>
+                        <a:rPr lang="en-GB" b="0" i="1" smtClean="0">
+                          <a:latin typeface="Cambria Math" panose="02040503050406030204" pitchFamily="18" charset="0"/>
+                        </a:rPr>
+                        <m:t>𝑐</m:t>
+                      </m:r>
+                    </m:oMath>
+                  </m:oMathPara>
+                </a14:m>
+                <a:endParaRPr lang="en-GB" dirty="0"/>
+              </a:p>
+            </p:txBody>
+          </p:sp>
+        </mc:Choice>
+        <mc:Fallback>
+          <p:sp>
+            <p:nvSpPr>
+              <p:cNvPr id="2" name="TextBox 1">
+                <a:extLst>
+                  <a:ext uri="{FF2B5EF4-FFF2-40B4-BE49-F238E27FC236}">
+                    <a16:creationId xmlns:a16="http://schemas.microsoft.com/office/drawing/2014/main" id="{56D89925-F3CA-F571-8C5E-4BF5E586EF39}"/>
+                  </a:ext>
+                </a:extLst>
+              </p:cNvPr>
+              <p:cNvSpPr txBox="1">
+                <a:spLocks noRot="1" noChangeAspect="1" noMove="1" noResize="1" noEditPoints="1" noAdjustHandles="1" noChangeArrowheads="1" noChangeShapeType="1" noTextEdit="1"/>
+              </p:cNvSpPr>
+              <p:nvPr/>
+            </p:nvSpPr>
+            <p:spPr>
+              <a:xfrm>
+                <a:off x="2446785" y="2493514"/>
+                <a:ext cx="166006" cy="276999"/>
+              </a:xfrm>
+              <a:prstGeom prst="rect">
+                <a:avLst/>
+              </a:prstGeom>
+              <a:blipFill>
+                <a:blip r:embed="rId13"/>
+                <a:stretch>
+                  <a:fillRect l="-21429" r="-10714"/>
+                </a:stretch>
+              </a:blipFill>
+            </p:spPr>
+            <p:txBody>
+              <a:bodyPr/>
+              <a:lstStyle/>
+              <a:p>
+                <a:r>
+                  <a:rPr lang="en-GB">
+                    <a:noFill/>
+                  </a:rPr>
+                  <a:t> </a:t>
+                </a:r>
+              </a:p>
+            </p:txBody>
+          </p:sp>
+        </mc:Fallback>
+      </mc:AlternateContent>
+    </p:spTree>
+    <p:extLst>
+      <p:ext uri="{BB962C8B-B14F-4D97-AF65-F5344CB8AC3E}">
+        <p14:creationId xmlns:p14="http://schemas.microsoft.com/office/powerpoint/2010/main" val="3585194022"/>
+      </p:ext>
+    </p:extLst>
+  </p:cSld>
+  <p:clrMapOvr>
+    <a:masterClrMapping/>
+  </p:clrMapOvr>
+</p:sld>
+</file>
+
+<file path=ppt/slides/slide5.xml><?xml version="1.0" encoding="utf-8"?>
+<p:sld xmlns:a="http://schemas.openxmlformats.org/drawingml/2006/main" xmlns:r="http://schemas.openxmlformats.org/officeDocument/2006/relationships" xmlns:p="http://schemas.openxmlformats.org/presentationml/2006/main">
+  <p:cSld>
+    <p:spTree>
+      <p:nvGrpSpPr>
+        <p:cNvPr id="1" name=""/>
+        <p:cNvGrpSpPr/>
+        <p:nvPr/>
+      </p:nvGrpSpPr>
+      <p:grpSpPr>
+        <a:xfrm>
+          <a:off x="0" y="0"/>
+          <a:ext cx="0" cy="0"/>
+          <a:chOff x="0" y="0"/>
+          <a:chExt cx="0" cy="0"/>
+        </a:xfrm>
+      </p:grpSpPr>
+      <p:cxnSp>
+        <p:nvCxnSpPr>
           <p:cNvPr id="396" name="Straight Connector 395">
             <a:extLst>
               <a:ext uri="{FF2B5EF4-FFF2-40B4-BE49-F238E27FC236}">
@@ -13743,7 +17373,7 @@
 </p:sld>
 </file>
 
-<file path=ppt/slides/slide5.xml><?xml version="1.0" encoding="utf-8"?>
+<file path=ppt/slides/slide6.xml><?xml version="1.0" encoding="utf-8"?>
 <p:sld xmlns:a="http://schemas.openxmlformats.org/drawingml/2006/main" xmlns:r="http://schemas.openxmlformats.org/officeDocument/2006/relationships" xmlns:p="http://schemas.openxmlformats.org/presentationml/2006/main">
   <p:cSld>
     <p:spTree>
@@ -36484,7 +40114,7 @@
 </p:sld>
 </file>
 
-<file path=ppt/slides/slide6.xml><?xml version="1.0" encoding="utf-8"?>
+<file path=ppt/slides/slide7.xml><?xml version="1.0" encoding="utf-8"?>
 <p:sld xmlns:a="http://schemas.openxmlformats.org/drawingml/2006/main" xmlns:r="http://schemas.openxmlformats.org/officeDocument/2006/relationships" xmlns:p="http://schemas.openxmlformats.org/presentationml/2006/main">
   <p:cSld>
     <p:spTree>

</xml_diff>

<commit_message>
update figure layout power plant
</commit_message>
<xml_diff>
--- a/Figures/Chapter_10/drawings/Fig10 drawings.pptx
+++ b/Figures/Chapter_10/drawings/Fig10 drawings.pptx
@@ -203,7 +203,7 @@
           <a:p>
             <a:fld id="{326D34BC-276F-46AD-B176-336C3E79BC3C}" type="datetimeFigureOut">
               <a:rPr lang="en-GB" smtClean="0"/>
-              <a:t>26/07/2023</a:t>
+              <a:t>22/08/2023</a:t>
             </a:fld>
             <a:endParaRPr lang="en-GB"/>
           </a:p>
@@ -788,7 +788,7 @@
           <a:p>
             <a:fld id="{8B1A925D-6802-4F82-B3A4-43BDB522D203}" type="datetimeFigureOut">
               <a:rPr lang="en-GB" smtClean="0"/>
-              <a:t>26/07/2023</a:t>
+              <a:t>22/08/2023</a:t>
             </a:fld>
             <a:endParaRPr lang="en-GB"/>
           </a:p>
@@ -988,7 +988,7 @@
           <a:p>
             <a:fld id="{8B1A925D-6802-4F82-B3A4-43BDB522D203}" type="datetimeFigureOut">
               <a:rPr lang="en-GB" smtClean="0"/>
-              <a:t>26/07/2023</a:t>
+              <a:t>22/08/2023</a:t>
             </a:fld>
             <a:endParaRPr lang="en-GB"/>
           </a:p>
@@ -1198,7 +1198,7 @@
           <a:p>
             <a:fld id="{8B1A925D-6802-4F82-B3A4-43BDB522D203}" type="datetimeFigureOut">
               <a:rPr lang="en-GB" smtClean="0"/>
-              <a:t>26/07/2023</a:t>
+              <a:t>22/08/2023</a:t>
             </a:fld>
             <a:endParaRPr lang="en-GB"/>
           </a:p>
@@ -1398,7 +1398,7 @@
           <a:p>
             <a:fld id="{8B1A925D-6802-4F82-B3A4-43BDB522D203}" type="datetimeFigureOut">
               <a:rPr lang="en-GB" smtClean="0"/>
-              <a:t>26/07/2023</a:t>
+              <a:t>22/08/2023</a:t>
             </a:fld>
             <a:endParaRPr lang="en-GB"/>
           </a:p>
@@ -1674,7 +1674,7 @@
           <a:p>
             <a:fld id="{8B1A925D-6802-4F82-B3A4-43BDB522D203}" type="datetimeFigureOut">
               <a:rPr lang="en-GB" smtClean="0"/>
-              <a:t>26/07/2023</a:t>
+              <a:t>22/08/2023</a:t>
             </a:fld>
             <a:endParaRPr lang="en-GB"/>
           </a:p>
@@ -1942,7 +1942,7 @@
           <a:p>
             <a:fld id="{8B1A925D-6802-4F82-B3A4-43BDB522D203}" type="datetimeFigureOut">
               <a:rPr lang="en-GB" smtClean="0"/>
-              <a:t>26/07/2023</a:t>
+              <a:t>22/08/2023</a:t>
             </a:fld>
             <a:endParaRPr lang="en-GB"/>
           </a:p>
@@ -2357,7 +2357,7 @@
           <a:p>
             <a:fld id="{8B1A925D-6802-4F82-B3A4-43BDB522D203}" type="datetimeFigureOut">
               <a:rPr lang="en-GB" smtClean="0"/>
-              <a:t>26/07/2023</a:t>
+              <a:t>22/08/2023</a:t>
             </a:fld>
             <a:endParaRPr lang="en-GB"/>
           </a:p>
@@ -2499,7 +2499,7 @@
           <a:p>
             <a:fld id="{8B1A925D-6802-4F82-B3A4-43BDB522D203}" type="datetimeFigureOut">
               <a:rPr lang="en-GB" smtClean="0"/>
-              <a:t>26/07/2023</a:t>
+              <a:t>22/08/2023</a:t>
             </a:fld>
             <a:endParaRPr lang="en-GB"/>
           </a:p>
@@ -2612,7 +2612,7 @@
           <a:p>
             <a:fld id="{8B1A925D-6802-4F82-B3A4-43BDB522D203}" type="datetimeFigureOut">
               <a:rPr lang="en-GB" smtClean="0"/>
-              <a:t>26/07/2023</a:t>
+              <a:t>22/08/2023</a:t>
             </a:fld>
             <a:endParaRPr lang="en-GB"/>
           </a:p>
@@ -2925,7 +2925,7 @@
           <a:p>
             <a:fld id="{8B1A925D-6802-4F82-B3A4-43BDB522D203}" type="datetimeFigureOut">
               <a:rPr lang="en-GB" smtClean="0"/>
-              <a:t>26/07/2023</a:t>
+              <a:t>22/08/2023</a:t>
             </a:fld>
             <a:endParaRPr lang="en-GB"/>
           </a:p>
@@ -3214,7 +3214,7 @@
           <a:p>
             <a:fld id="{8B1A925D-6802-4F82-B3A4-43BDB522D203}" type="datetimeFigureOut">
               <a:rPr lang="en-GB" smtClean="0"/>
-              <a:t>26/07/2023</a:t>
+              <a:t>22/08/2023</a:t>
             </a:fld>
             <a:endParaRPr lang="en-GB"/>
           </a:p>
@@ -3457,7 +3457,7 @@
           <a:p>
             <a:fld id="{8B1A925D-6802-4F82-B3A4-43BDB522D203}" type="datetimeFigureOut">
               <a:rPr lang="en-GB" smtClean="0"/>
-              <a:t>26/07/2023</a:t>
+              <a:t>22/08/2023</a:t>
             </a:fld>
             <a:endParaRPr lang="en-GB"/>
           </a:p>
@@ -11883,8 +11883,8 @@
           </a:fontRef>
         </p:style>
       </p:cxnSp>
-      <mc:AlternateContent xmlns:mc="http://schemas.openxmlformats.org/markup-compatibility/2006">
-        <mc:Choice xmlns:a14="http://schemas.microsoft.com/office/drawing/2010/main" Requires="a14">
+      <mc:AlternateContent xmlns:mc="http://schemas.openxmlformats.org/markup-compatibility/2006" xmlns:a14="http://schemas.microsoft.com/office/drawing/2010/main">
+        <mc:Choice Requires="a14">
           <p:sp>
             <p:nvSpPr>
               <p:cNvPr id="20" name="TextBox 19">
@@ -11934,7 +11934,7 @@
             </p:txBody>
           </p:sp>
         </mc:Choice>
-        <mc:Fallback>
+        <mc:Fallback xmlns="">
           <p:sp>
             <p:nvSpPr>
               <p:cNvPr id="20" name="TextBox 19">
@@ -12146,8 +12146,8 @@
           </p:sp>
         </mc:Fallback>
       </mc:AlternateContent>
-      <mc:AlternateContent xmlns:mc="http://schemas.openxmlformats.org/markup-compatibility/2006">
-        <mc:Choice xmlns:a14="http://schemas.microsoft.com/office/drawing/2010/main" Requires="a14">
+      <mc:AlternateContent xmlns:mc="http://schemas.openxmlformats.org/markup-compatibility/2006" xmlns:a14="http://schemas.microsoft.com/office/drawing/2010/main">
+        <mc:Choice Requires="a14">
           <p:sp>
             <p:nvSpPr>
               <p:cNvPr id="2" name="TextBox 1">
@@ -12197,7 +12197,7 @@
             </p:txBody>
           </p:sp>
         </mc:Choice>
-        <mc:Fallback>
+        <mc:Fallback xmlns="">
           <p:sp>
             <p:nvSpPr>
               <p:cNvPr id="2" name="TextBox 1">
@@ -17529,7 +17529,7 @@
             <a:pPr algn="ctr"/>
             <a:r>
               <a:rPr lang="en-GB" dirty="0"/>
-              <a:t>MV/LV transformer</a:t>
+              <a:t>MV/HV transformer</a:t>
             </a:r>
           </a:p>
         </p:txBody>

</xml_diff>

<commit_message>
final changes figures chapter 10
</commit_message>
<xml_diff>
--- a/Figures/Chapter_10/drawings/Fig10 drawings.pptx
+++ b/Figures/Chapter_10/drawings/Fig10 drawings.pptx
@@ -203,7 +203,7 @@
           <a:p>
             <a:fld id="{326D34BC-276F-46AD-B176-336C3E79BC3C}" type="datetimeFigureOut">
               <a:rPr lang="en-GB" smtClean="0"/>
-              <a:t>22/08/2023</a:t>
+              <a:t>26/08/2023</a:t>
             </a:fld>
             <a:endParaRPr lang="en-GB"/>
           </a:p>
@@ -788,7 +788,7 @@
           <a:p>
             <a:fld id="{8B1A925D-6802-4F82-B3A4-43BDB522D203}" type="datetimeFigureOut">
               <a:rPr lang="en-GB" smtClean="0"/>
-              <a:t>22/08/2023</a:t>
+              <a:t>26/08/2023</a:t>
             </a:fld>
             <a:endParaRPr lang="en-GB"/>
           </a:p>
@@ -988,7 +988,7 @@
           <a:p>
             <a:fld id="{8B1A925D-6802-4F82-B3A4-43BDB522D203}" type="datetimeFigureOut">
               <a:rPr lang="en-GB" smtClean="0"/>
-              <a:t>22/08/2023</a:t>
+              <a:t>26/08/2023</a:t>
             </a:fld>
             <a:endParaRPr lang="en-GB"/>
           </a:p>
@@ -1198,7 +1198,7 @@
           <a:p>
             <a:fld id="{8B1A925D-6802-4F82-B3A4-43BDB522D203}" type="datetimeFigureOut">
               <a:rPr lang="en-GB" smtClean="0"/>
-              <a:t>22/08/2023</a:t>
+              <a:t>26/08/2023</a:t>
             </a:fld>
             <a:endParaRPr lang="en-GB"/>
           </a:p>
@@ -1398,7 +1398,7 @@
           <a:p>
             <a:fld id="{8B1A925D-6802-4F82-B3A4-43BDB522D203}" type="datetimeFigureOut">
               <a:rPr lang="en-GB" smtClean="0"/>
-              <a:t>22/08/2023</a:t>
+              <a:t>26/08/2023</a:t>
             </a:fld>
             <a:endParaRPr lang="en-GB"/>
           </a:p>
@@ -1674,7 +1674,7 @@
           <a:p>
             <a:fld id="{8B1A925D-6802-4F82-B3A4-43BDB522D203}" type="datetimeFigureOut">
               <a:rPr lang="en-GB" smtClean="0"/>
-              <a:t>22/08/2023</a:t>
+              <a:t>26/08/2023</a:t>
             </a:fld>
             <a:endParaRPr lang="en-GB"/>
           </a:p>
@@ -1942,7 +1942,7 @@
           <a:p>
             <a:fld id="{8B1A925D-6802-4F82-B3A4-43BDB522D203}" type="datetimeFigureOut">
               <a:rPr lang="en-GB" smtClean="0"/>
-              <a:t>22/08/2023</a:t>
+              <a:t>26/08/2023</a:t>
             </a:fld>
             <a:endParaRPr lang="en-GB"/>
           </a:p>
@@ -2357,7 +2357,7 @@
           <a:p>
             <a:fld id="{8B1A925D-6802-4F82-B3A4-43BDB522D203}" type="datetimeFigureOut">
               <a:rPr lang="en-GB" smtClean="0"/>
-              <a:t>22/08/2023</a:t>
+              <a:t>26/08/2023</a:t>
             </a:fld>
             <a:endParaRPr lang="en-GB"/>
           </a:p>
@@ -2499,7 +2499,7 @@
           <a:p>
             <a:fld id="{8B1A925D-6802-4F82-B3A4-43BDB522D203}" type="datetimeFigureOut">
               <a:rPr lang="en-GB" smtClean="0"/>
-              <a:t>22/08/2023</a:t>
+              <a:t>26/08/2023</a:t>
             </a:fld>
             <a:endParaRPr lang="en-GB"/>
           </a:p>
@@ -2612,7 +2612,7 @@
           <a:p>
             <a:fld id="{8B1A925D-6802-4F82-B3A4-43BDB522D203}" type="datetimeFigureOut">
               <a:rPr lang="en-GB" smtClean="0"/>
-              <a:t>22/08/2023</a:t>
+              <a:t>26/08/2023</a:t>
             </a:fld>
             <a:endParaRPr lang="en-GB"/>
           </a:p>
@@ -2925,7 +2925,7 @@
           <a:p>
             <a:fld id="{8B1A925D-6802-4F82-B3A4-43BDB522D203}" type="datetimeFigureOut">
               <a:rPr lang="en-GB" smtClean="0"/>
-              <a:t>22/08/2023</a:t>
+              <a:t>26/08/2023</a:t>
             </a:fld>
             <a:endParaRPr lang="en-GB"/>
           </a:p>
@@ -3214,7 +3214,7 @@
           <a:p>
             <a:fld id="{8B1A925D-6802-4F82-B3A4-43BDB522D203}" type="datetimeFigureOut">
               <a:rPr lang="en-GB" smtClean="0"/>
-              <a:t>22/08/2023</a:t>
+              <a:t>26/08/2023</a:t>
             </a:fld>
             <a:endParaRPr lang="en-GB"/>
           </a:p>
@@ -3457,7 +3457,7 @@
           <a:p>
             <a:fld id="{8B1A925D-6802-4F82-B3A4-43BDB522D203}" type="datetimeFigureOut">
               <a:rPr lang="en-GB" smtClean="0"/>
-              <a:t>22/08/2023</a:t>
+              <a:t>26/08/2023</a:t>
             </a:fld>
             <a:endParaRPr lang="en-GB"/>
           </a:p>
@@ -3889,9 +3889,9 @@
         <p:grpSpPr>
           <a:xfrm>
             <a:off x="0" y="70109"/>
-            <a:ext cx="8139962" cy="3110430"/>
+            <a:ext cx="8139962" cy="2716277"/>
             <a:chOff x="2223238" y="220570"/>
-            <a:chExt cx="8139962" cy="3110430"/>
+            <a:chExt cx="8139962" cy="2716277"/>
           </a:xfrm>
         </p:grpSpPr>
         <p:sp>
@@ -4356,8 +4356,8 @@
           </p:nvSpPr>
           <p:spPr>
             <a:xfrm>
-              <a:off x="2976116" y="1382764"/>
-              <a:ext cx="1697888" cy="338554"/>
+              <a:off x="3222421" y="1366129"/>
+              <a:ext cx="1697888" cy="307777"/>
             </a:xfrm>
             <a:prstGeom prst="rect">
               <a:avLst/>
@@ -4371,7 +4371,7 @@
             <a:lstStyle/>
             <a:p>
               <a:r>
-                <a:rPr lang="en-GB" sz="1600" dirty="0"/>
+                <a:rPr lang="en-GB" sz="1400" dirty="0"/>
                 <a:t>Commissioning</a:t>
               </a:r>
             </a:p>
@@ -4391,8 +4391,8 @@
           </p:nvSpPr>
           <p:spPr>
             <a:xfrm>
-              <a:off x="3612912" y="1633420"/>
-              <a:ext cx="1292922" cy="1077218"/>
+              <a:off x="3526646" y="1633420"/>
+              <a:ext cx="1379188" cy="738664"/>
             </a:xfrm>
             <a:prstGeom prst="rect">
               <a:avLst/>
@@ -4407,14 +4407,14 @@
             <a:p>
               <a:pPr algn="r"/>
               <a:r>
-                <a:rPr lang="en-GB" sz="1600" dirty="0"/>
+                <a:rPr lang="en-GB" sz="1400" dirty="0"/>
                 <a:t>Provisional Acceptance</a:t>
               </a:r>
             </a:p>
             <a:p>
               <a:pPr algn="r"/>
               <a:r>
-                <a:rPr lang="en-GB" sz="1600" dirty="0"/>
+                <a:rPr lang="en-GB" sz="1400" dirty="0"/>
                 <a:t>Certificate (PAC)</a:t>
               </a:r>
             </a:p>
@@ -4434,8 +4434,8 @@
           </p:nvSpPr>
           <p:spPr>
             <a:xfrm>
-              <a:off x="5542630" y="1382764"/>
-              <a:ext cx="2058106" cy="338554"/>
+              <a:off x="5548640" y="1382764"/>
+              <a:ext cx="2058106" cy="307777"/>
             </a:xfrm>
             <a:prstGeom prst="rect">
               <a:avLst/>
@@ -4449,7 +4449,7 @@
             <a:lstStyle/>
             <a:p>
               <a:r>
-                <a:rPr lang="en-GB" sz="1600" dirty="0"/>
+                <a:rPr lang="en-GB" sz="1400" dirty="0"/>
                 <a:t>Final owner take-over</a:t>
               </a:r>
             </a:p>
@@ -4470,7 +4470,7 @@
           <p:spPr>
             <a:xfrm>
               <a:off x="5071460" y="1633420"/>
-              <a:ext cx="1379188" cy="1077218"/>
+              <a:ext cx="1379188" cy="738664"/>
             </a:xfrm>
             <a:prstGeom prst="rect">
               <a:avLst/>
@@ -4484,13 +4484,13 @@
             <a:lstStyle/>
             <a:p>
               <a:r>
-                <a:rPr lang="en-GB" sz="1600" dirty="0"/>
+                <a:rPr lang="en-GB" sz="1400" dirty="0"/>
                 <a:t>Final Acceptance</a:t>
               </a:r>
             </a:p>
             <a:p>
               <a:r>
-                <a:rPr lang="en-GB" sz="1600" dirty="0"/>
+                <a:rPr lang="en-GB" sz="1400" dirty="0"/>
                 <a:t>Certificate (FAC)</a:t>
               </a:r>
             </a:p>
@@ -4512,7 +4512,7 @@
           </p:nvCxnSpPr>
           <p:spPr>
             <a:xfrm>
-              <a:off x="4781562" y="2722021"/>
+              <a:off x="4789318" y="2372084"/>
               <a:ext cx="396000" cy="0"/>
             </a:xfrm>
             <a:prstGeom prst="straightConnector1">
@@ -4555,8 +4555,8 @@
           </p:nvSpPr>
           <p:spPr>
             <a:xfrm>
-              <a:off x="4245280" y="2746225"/>
-              <a:ext cx="1527447" cy="584775"/>
+              <a:off x="4233607" y="2413627"/>
+              <a:ext cx="1527447" cy="523220"/>
             </a:xfrm>
             <a:prstGeom prst="rect">
               <a:avLst/>
@@ -4571,7 +4571,7 @@
             <a:p>
               <a:pPr algn="ctr"/>
               <a:r>
-                <a:rPr lang="en-GB" sz="1600" dirty="0"/>
+                <a:rPr lang="en-GB" sz="1400" dirty="0"/>
                 <a:t>2 year EPC warranty period</a:t>
               </a:r>
             </a:p>
@@ -4765,8 +4765,8 @@
           </p:nvCxnSpPr>
           <p:spPr>
             <a:xfrm>
-              <a:off x="5157226" y="1301805"/>
-              <a:ext cx="385404" cy="250236"/>
+              <a:off x="5163236" y="1301805"/>
+              <a:ext cx="385404" cy="234848"/>
             </a:xfrm>
             <a:prstGeom prst="line">
               <a:avLst/>
@@ -18466,7 +18466,7 @@
         </p:nvSpPr>
         <p:spPr>
           <a:xfrm>
-            <a:off x="466775" y="251727"/>
+            <a:off x="709306" y="259581"/>
             <a:ext cx="1978655" cy="369332"/>
           </a:xfrm>
           <a:prstGeom prst="rect">
@@ -18483,7 +18483,7 @@
             <a:pPr algn="ctr"/>
             <a:r>
               <a:rPr lang="en-GB" dirty="0"/>
-              <a:t>MV inner grid</a:t>
+              <a:t>MV internal grid</a:t>
             </a:r>
           </a:p>
         </p:txBody>

</xml_diff>

<commit_message>
increase quality images chapter 10
</commit_message>
<xml_diff>
--- a/Figures/Chapter_10/drawings/Fig10 drawings.pptx
+++ b/Figures/Chapter_10/drawings/Fig10 drawings.pptx
@@ -203,7 +203,7 @@
           <a:p>
             <a:fld id="{326D34BC-276F-46AD-B176-336C3E79BC3C}" type="datetimeFigureOut">
               <a:rPr lang="en-GB" smtClean="0"/>
-              <a:t>26/08/2023</a:t>
+              <a:t>31/08/2023</a:t>
             </a:fld>
             <a:endParaRPr lang="en-GB"/>
           </a:p>
@@ -788,7 +788,7 @@
           <a:p>
             <a:fld id="{8B1A925D-6802-4F82-B3A4-43BDB522D203}" type="datetimeFigureOut">
               <a:rPr lang="en-GB" smtClean="0"/>
-              <a:t>26/08/2023</a:t>
+              <a:t>31/08/2023</a:t>
             </a:fld>
             <a:endParaRPr lang="en-GB"/>
           </a:p>
@@ -988,7 +988,7 @@
           <a:p>
             <a:fld id="{8B1A925D-6802-4F82-B3A4-43BDB522D203}" type="datetimeFigureOut">
               <a:rPr lang="en-GB" smtClean="0"/>
-              <a:t>26/08/2023</a:t>
+              <a:t>31/08/2023</a:t>
             </a:fld>
             <a:endParaRPr lang="en-GB"/>
           </a:p>
@@ -1198,7 +1198,7 @@
           <a:p>
             <a:fld id="{8B1A925D-6802-4F82-B3A4-43BDB522D203}" type="datetimeFigureOut">
               <a:rPr lang="en-GB" smtClean="0"/>
-              <a:t>26/08/2023</a:t>
+              <a:t>31/08/2023</a:t>
             </a:fld>
             <a:endParaRPr lang="en-GB"/>
           </a:p>
@@ -1398,7 +1398,7 @@
           <a:p>
             <a:fld id="{8B1A925D-6802-4F82-B3A4-43BDB522D203}" type="datetimeFigureOut">
               <a:rPr lang="en-GB" smtClean="0"/>
-              <a:t>26/08/2023</a:t>
+              <a:t>31/08/2023</a:t>
             </a:fld>
             <a:endParaRPr lang="en-GB"/>
           </a:p>
@@ -1674,7 +1674,7 @@
           <a:p>
             <a:fld id="{8B1A925D-6802-4F82-B3A4-43BDB522D203}" type="datetimeFigureOut">
               <a:rPr lang="en-GB" smtClean="0"/>
-              <a:t>26/08/2023</a:t>
+              <a:t>31/08/2023</a:t>
             </a:fld>
             <a:endParaRPr lang="en-GB"/>
           </a:p>
@@ -1942,7 +1942,7 @@
           <a:p>
             <a:fld id="{8B1A925D-6802-4F82-B3A4-43BDB522D203}" type="datetimeFigureOut">
               <a:rPr lang="en-GB" smtClean="0"/>
-              <a:t>26/08/2023</a:t>
+              <a:t>31/08/2023</a:t>
             </a:fld>
             <a:endParaRPr lang="en-GB"/>
           </a:p>
@@ -2357,7 +2357,7 @@
           <a:p>
             <a:fld id="{8B1A925D-6802-4F82-B3A4-43BDB522D203}" type="datetimeFigureOut">
               <a:rPr lang="en-GB" smtClean="0"/>
-              <a:t>26/08/2023</a:t>
+              <a:t>31/08/2023</a:t>
             </a:fld>
             <a:endParaRPr lang="en-GB"/>
           </a:p>
@@ -2499,7 +2499,7 @@
           <a:p>
             <a:fld id="{8B1A925D-6802-4F82-B3A4-43BDB522D203}" type="datetimeFigureOut">
               <a:rPr lang="en-GB" smtClean="0"/>
-              <a:t>26/08/2023</a:t>
+              <a:t>31/08/2023</a:t>
             </a:fld>
             <a:endParaRPr lang="en-GB"/>
           </a:p>
@@ -2612,7 +2612,7 @@
           <a:p>
             <a:fld id="{8B1A925D-6802-4F82-B3A4-43BDB522D203}" type="datetimeFigureOut">
               <a:rPr lang="en-GB" smtClean="0"/>
-              <a:t>26/08/2023</a:t>
+              <a:t>31/08/2023</a:t>
             </a:fld>
             <a:endParaRPr lang="en-GB"/>
           </a:p>
@@ -2925,7 +2925,7 @@
           <a:p>
             <a:fld id="{8B1A925D-6802-4F82-B3A4-43BDB522D203}" type="datetimeFigureOut">
               <a:rPr lang="en-GB" smtClean="0"/>
-              <a:t>26/08/2023</a:t>
+              <a:t>31/08/2023</a:t>
             </a:fld>
             <a:endParaRPr lang="en-GB"/>
           </a:p>
@@ -3214,7 +3214,7 @@
           <a:p>
             <a:fld id="{8B1A925D-6802-4F82-B3A4-43BDB522D203}" type="datetimeFigureOut">
               <a:rPr lang="en-GB" smtClean="0"/>
-              <a:t>26/08/2023</a:t>
+              <a:t>31/08/2023</a:t>
             </a:fld>
             <a:endParaRPr lang="en-GB"/>
           </a:p>
@@ -3457,7 +3457,7 @@
           <a:p>
             <a:fld id="{8B1A925D-6802-4F82-B3A4-43BDB522D203}" type="datetimeFigureOut">
               <a:rPr lang="en-GB" smtClean="0"/>
-              <a:t>26/08/2023</a:t>
+              <a:t>31/08/2023</a:t>
             </a:fld>
             <a:endParaRPr lang="en-GB"/>
           </a:p>

</xml_diff>